<commit_message>
Added up through challenge 2
</commit_message>
<xml_diff>
--- a/slides/Slides.pptx
+++ b/slides/Slides.pptx
@@ -17,6 +17,14 @@
     <p:sldId id="288" r:id="rId11"/>
     <p:sldId id="290" r:id="rId12"/>
     <p:sldId id="291" r:id="rId13"/>
+    <p:sldId id="296" r:id="rId14"/>
+    <p:sldId id="298" r:id="rId15"/>
+    <p:sldId id="265" r:id="rId16"/>
+    <p:sldId id="299" r:id="rId17"/>
+    <p:sldId id="262" r:id="rId18"/>
+    <p:sldId id="266" r:id="rId19"/>
+    <p:sldId id="264" r:id="rId20"/>
+    <p:sldId id="297" r:id="rId21"/>
   </p:sldIdLst>
   <p:sldSz cx="18288000" cy="10287000"/>
   <p:notesSz cx="6858000" cy="9144000"/>
@@ -4072,6 +4080,2404 @@
 </p:sld>
 </file>
 
+<file path=ppt/slides/slide13.xml><?xml version="1.0" encoding="utf-8"?>
+<p:sld xmlns:a="http://schemas.openxmlformats.org/drawingml/2006/main" xmlns:r="http://schemas.openxmlformats.org/officeDocument/2006/relationships" xmlns:p="http://schemas.openxmlformats.org/presentationml/2006/main">
+  <p:cSld>
+    <p:spTree>
+      <p:nvGrpSpPr>
+        <p:cNvPr id="1" name=""/>
+        <p:cNvGrpSpPr/>
+        <p:nvPr/>
+      </p:nvGrpSpPr>
+      <p:grpSpPr>
+        <a:xfrm>
+          <a:off x="0" y="0"/>
+          <a:ext cx="0" cy="0"/>
+          <a:chOff x="0" y="0"/>
+          <a:chExt cx="0" cy="0"/>
+        </a:xfrm>
+      </p:grpSpPr>
+      <p:sp>
+        <p:nvSpPr>
+          <p:cNvPr id="4" name="Title 3">
+            <a:extLst>
+              <a:ext uri="{FF2B5EF4-FFF2-40B4-BE49-F238E27FC236}">
+                <a16:creationId xmlns:a16="http://schemas.microsoft.com/office/drawing/2014/main" id="{6F393B89-D9D9-7C59-3F9F-2644D67EBCFC}"/>
+              </a:ext>
+            </a:extLst>
+          </p:cNvPr>
+          <p:cNvSpPr>
+            <a:spLocks noGrp="1"/>
+          </p:cNvSpPr>
+          <p:nvPr>
+            <p:ph type="title"/>
+          </p:nvPr>
+        </p:nvSpPr>
+        <p:spPr/>
+        <p:txBody>
+          <a:bodyPr>
+            <a:normAutofit/>
+          </a:bodyPr>
+          <a:lstStyle/>
+          <a:p>
+            <a:r>
+              <a:rPr lang="en-US" sz="6600" dirty="0"/>
+              <a:t>Exercise 1: Blinky</a:t>
+            </a:r>
+          </a:p>
+        </p:txBody>
+      </p:sp>
+      <p:sp>
+        <p:nvSpPr>
+          <p:cNvPr id="5" name="Text Placeholder 4">
+            <a:extLst>
+              <a:ext uri="{FF2B5EF4-FFF2-40B4-BE49-F238E27FC236}">
+                <a16:creationId xmlns:a16="http://schemas.microsoft.com/office/drawing/2014/main" id="{E722B2C0-10DB-9E23-D585-69C822AAD8DC}"/>
+              </a:ext>
+            </a:extLst>
+          </p:cNvPr>
+          <p:cNvSpPr>
+            <a:spLocks noGrp="1"/>
+          </p:cNvSpPr>
+          <p:nvPr>
+            <p:ph type="body" idx="1"/>
+          </p:nvPr>
+        </p:nvSpPr>
+        <p:spPr/>
+        <p:txBody>
+          <a:bodyPr/>
+          <a:lstStyle/>
+          <a:p>
+            <a:r>
+              <a:rPr lang="en-US" dirty="0">
+                <a:solidFill>
+                  <a:schemeClr val="bg1"/>
+                </a:solidFill>
+                <a:latin typeface="Roboto" panose="02000000000000000000" pitchFamily="2" charset="0"/>
+              </a:rPr>
+              <a:t>github.com/</a:t>
+            </a:r>
+            <a:r>
+              <a:rPr lang="en-US" dirty="0" err="1">
+                <a:solidFill>
+                  <a:schemeClr val="bg1"/>
+                </a:solidFill>
+                <a:latin typeface="Roboto" panose="02000000000000000000" pitchFamily="2" charset="0"/>
+              </a:rPr>
+              <a:t>ShawnHymel</a:t>
+            </a:r>
+            <a:r>
+              <a:rPr lang="en-US" dirty="0">
+                <a:solidFill>
+                  <a:schemeClr val="bg1"/>
+                </a:solidFill>
+                <a:latin typeface="Roboto" panose="02000000000000000000" pitchFamily="2" charset="0"/>
+              </a:rPr>
+              <a:t>/workshop-embedded-rust</a:t>
+            </a:r>
+            <a:endParaRPr lang="en-US" dirty="0"/>
+          </a:p>
+        </p:txBody>
+      </p:sp>
+    </p:spTree>
+    <p:extLst>
+      <p:ext uri="{BB962C8B-B14F-4D97-AF65-F5344CB8AC3E}">
+        <p14:creationId xmlns:p14="http://schemas.microsoft.com/office/powerpoint/2010/main" val="4053833433"/>
+      </p:ext>
+    </p:extLst>
+  </p:cSld>
+  <p:clrMapOvr>
+    <a:masterClrMapping/>
+  </p:clrMapOvr>
+  <mc:AlternateContent xmlns:mc="http://schemas.openxmlformats.org/markup-compatibility/2006" xmlns:p14="http://schemas.microsoft.com/office/powerpoint/2010/main">
+    <mc:Choice Requires="p14">
+      <p:transition spd="med" p14:dur="700">
+        <p:fade/>
+      </p:transition>
+    </mc:Choice>
+    <mc:Fallback xmlns="">
+      <p:transition spd="med">
+        <p:fade/>
+      </p:transition>
+    </mc:Fallback>
+  </mc:AlternateContent>
+</p:sld>
+</file>
+
+<file path=ppt/slides/slide14.xml><?xml version="1.0" encoding="utf-8"?>
+<p:sld xmlns:a="http://schemas.openxmlformats.org/drawingml/2006/main" xmlns:r="http://schemas.openxmlformats.org/officeDocument/2006/relationships" xmlns:p="http://schemas.openxmlformats.org/presentationml/2006/main">
+  <p:cSld>
+    <p:spTree>
+      <p:nvGrpSpPr>
+        <p:cNvPr id="1" name="">
+          <a:extLst>
+            <a:ext uri="{FF2B5EF4-FFF2-40B4-BE49-F238E27FC236}">
+              <a16:creationId xmlns:a16="http://schemas.microsoft.com/office/drawing/2014/main" id="{790EA382-5B44-18A6-CC4E-D027E19E2D33}"/>
+            </a:ext>
+          </a:extLst>
+        </p:cNvPr>
+        <p:cNvGrpSpPr/>
+        <p:nvPr/>
+      </p:nvGrpSpPr>
+      <p:grpSpPr>
+        <a:xfrm>
+          <a:off x="0" y="0"/>
+          <a:ext cx="0" cy="0"/>
+          <a:chOff x="0" y="0"/>
+          <a:chExt cx="0" cy="0"/>
+        </a:xfrm>
+      </p:grpSpPr>
+      <p:sp>
+        <p:nvSpPr>
+          <p:cNvPr id="4" name="Title 3">
+            <a:extLst>
+              <a:ext uri="{FF2B5EF4-FFF2-40B4-BE49-F238E27FC236}">
+                <a16:creationId xmlns:a16="http://schemas.microsoft.com/office/drawing/2014/main" id="{DB0E031C-C188-679F-4D65-23500E5271E0}"/>
+              </a:ext>
+            </a:extLst>
+          </p:cNvPr>
+          <p:cNvSpPr>
+            <a:spLocks noGrp="1"/>
+          </p:cNvSpPr>
+          <p:nvPr>
+            <p:ph type="title"/>
+          </p:nvPr>
+        </p:nvSpPr>
+        <p:spPr/>
+        <p:txBody>
+          <a:bodyPr>
+            <a:normAutofit/>
+          </a:bodyPr>
+          <a:lstStyle/>
+          <a:p>
+            <a:r>
+              <a:rPr lang="en-US" sz="6600" dirty="0"/>
+              <a:t>Exercise 2: Ownership and Borrowing</a:t>
+            </a:r>
+          </a:p>
+        </p:txBody>
+      </p:sp>
+      <p:sp>
+        <p:nvSpPr>
+          <p:cNvPr id="5" name="Text Placeholder 4">
+            <a:extLst>
+              <a:ext uri="{FF2B5EF4-FFF2-40B4-BE49-F238E27FC236}">
+                <a16:creationId xmlns:a16="http://schemas.microsoft.com/office/drawing/2014/main" id="{75E37810-2C38-4653-0CED-9DF6872882C2}"/>
+              </a:ext>
+            </a:extLst>
+          </p:cNvPr>
+          <p:cNvSpPr>
+            <a:spLocks noGrp="1"/>
+          </p:cNvSpPr>
+          <p:nvPr>
+            <p:ph type="body" idx="1"/>
+          </p:nvPr>
+        </p:nvSpPr>
+        <p:spPr/>
+        <p:txBody>
+          <a:bodyPr/>
+          <a:lstStyle/>
+          <a:p>
+            <a:r>
+              <a:rPr lang="en-US" dirty="0">
+                <a:solidFill>
+                  <a:schemeClr val="bg1"/>
+                </a:solidFill>
+                <a:latin typeface="Roboto" panose="02000000000000000000" pitchFamily="2" charset="0"/>
+              </a:rPr>
+              <a:t>github.com/</a:t>
+            </a:r>
+            <a:r>
+              <a:rPr lang="en-US" dirty="0" err="1">
+                <a:solidFill>
+                  <a:schemeClr val="bg1"/>
+                </a:solidFill>
+                <a:latin typeface="Roboto" panose="02000000000000000000" pitchFamily="2" charset="0"/>
+              </a:rPr>
+              <a:t>ShawnHymel</a:t>
+            </a:r>
+            <a:r>
+              <a:rPr lang="en-US" dirty="0">
+                <a:solidFill>
+                  <a:schemeClr val="bg1"/>
+                </a:solidFill>
+                <a:latin typeface="Roboto" panose="02000000000000000000" pitchFamily="2" charset="0"/>
+              </a:rPr>
+              <a:t>/workshop-embedded-rust</a:t>
+            </a:r>
+            <a:endParaRPr lang="en-US" dirty="0"/>
+          </a:p>
+        </p:txBody>
+      </p:sp>
+    </p:spTree>
+    <p:extLst>
+      <p:ext uri="{BB962C8B-B14F-4D97-AF65-F5344CB8AC3E}">
+        <p14:creationId xmlns:p14="http://schemas.microsoft.com/office/powerpoint/2010/main" val="3803341658"/>
+      </p:ext>
+    </p:extLst>
+  </p:cSld>
+  <p:clrMapOvr>
+    <a:masterClrMapping/>
+  </p:clrMapOvr>
+  <mc:AlternateContent xmlns:mc="http://schemas.openxmlformats.org/markup-compatibility/2006">
+    <mc:Choice xmlns:p14="http://schemas.microsoft.com/office/powerpoint/2010/main" Requires="p14">
+      <p:transition spd="med" p14:dur="700">
+        <p:fade/>
+      </p:transition>
+    </mc:Choice>
+    <mc:Fallback>
+      <p:transition spd="med">
+        <p:fade/>
+      </p:transition>
+    </mc:Fallback>
+  </mc:AlternateContent>
+</p:sld>
+</file>
+
+<file path=ppt/slides/slide15.xml><?xml version="1.0" encoding="utf-8"?>
+<p:sld xmlns:a="http://schemas.openxmlformats.org/drawingml/2006/main" xmlns:r="http://schemas.openxmlformats.org/officeDocument/2006/relationships" xmlns:p="http://schemas.openxmlformats.org/presentationml/2006/main">
+  <p:cSld>
+    <p:spTree>
+      <p:nvGrpSpPr>
+        <p:cNvPr id="1" name="">
+          <a:extLst>
+            <a:ext uri="{FF2B5EF4-FFF2-40B4-BE49-F238E27FC236}">
+              <a16:creationId xmlns:a16="http://schemas.microsoft.com/office/drawing/2014/main" id="{D346BC07-6CBC-2CCF-1BB5-FD8B6E385CBE}"/>
+            </a:ext>
+          </a:extLst>
+        </p:cNvPr>
+        <p:cNvGrpSpPr/>
+        <p:nvPr/>
+      </p:nvGrpSpPr>
+      <p:grpSpPr>
+        <a:xfrm>
+          <a:off x="0" y="0"/>
+          <a:ext cx="0" cy="0"/>
+          <a:chOff x="0" y="0"/>
+          <a:chExt cx="0" cy="0"/>
+        </a:xfrm>
+      </p:grpSpPr>
+      <p:sp>
+        <p:nvSpPr>
+          <p:cNvPr id="4" name="Title 1">
+            <a:extLst>
+              <a:ext uri="{FF2B5EF4-FFF2-40B4-BE49-F238E27FC236}">
+                <a16:creationId xmlns:a16="http://schemas.microsoft.com/office/drawing/2014/main" id="{4F427780-133A-DB05-EEBC-1B09B3C5366A}"/>
+              </a:ext>
+            </a:extLst>
+          </p:cNvPr>
+          <p:cNvSpPr>
+            <a:spLocks noGrp="1"/>
+          </p:cNvSpPr>
+          <p:nvPr>
+            <p:ph type="title"/>
+          </p:nvPr>
+        </p:nvSpPr>
+        <p:spPr>
+          <a:xfrm>
+            <a:off x="1257300" y="0"/>
+            <a:ext cx="15773400" cy="1988345"/>
+          </a:xfrm>
+        </p:spPr>
+        <p:txBody>
+          <a:bodyPr/>
+          <a:lstStyle/>
+          <a:p>
+            <a:pPr algn="ctr"/>
+            <a:r>
+              <a:rPr lang="en-US" dirty="0"/>
+              <a:t>Pointers and References</a:t>
+            </a:r>
+          </a:p>
+        </p:txBody>
+      </p:sp>
+      <p:sp>
+        <p:nvSpPr>
+          <p:cNvPr id="3" name="TextBox 2">
+            <a:extLst>
+              <a:ext uri="{FF2B5EF4-FFF2-40B4-BE49-F238E27FC236}">
+                <a16:creationId xmlns:a16="http://schemas.microsoft.com/office/drawing/2014/main" id="{119EAE51-0E3F-BC09-1C89-F6773AC14206}"/>
+              </a:ext>
+            </a:extLst>
+          </p:cNvPr>
+          <p:cNvSpPr txBox="1"/>
+          <p:nvPr/>
+        </p:nvSpPr>
+        <p:spPr>
+          <a:xfrm>
+            <a:off x="2423233" y="3223281"/>
+            <a:ext cx="13441533" cy="5078313"/>
+          </a:xfrm>
+          <a:prstGeom prst="rect">
+            <a:avLst/>
+          </a:prstGeom>
+          <a:noFill/>
+        </p:spPr>
+        <p:txBody>
+          <a:bodyPr wrap="square">
+            <a:spAutoFit/>
+          </a:bodyPr>
+          <a:lstStyle/>
+          <a:p>
+            <a:r>
+              <a:rPr lang="en-US" sz="3600" dirty="0" err="1">
+                <a:solidFill>
+                  <a:schemeClr val="bg1"/>
+                </a:solidFill>
+                <a:latin typeface="Roboto Mono" panose="00000009000000000000" pitchFamily="49" charset="0"/>
+                <a:ea typeface="Roboto Mono" panose="00000009000000000000" pitchFamily="49" charset="0"/>
+              </a:rPr>
+              <a:t>fn</a:t>
+            </a:r>
+            <a:r>
+              <a:rPr lang="en-US" sz="3600" dirty="0">
+                <a:solidFill>
+                  <a:schemeClr val="bg1"/>
+                </a:solidFill>
+                <a:latin typeface="Roboto Mono" panose="00000009000000000000" pitchFamily="49" charset="0"/>
+                <a:ea typeface="Roboto Mono" panose="00000009000000000000" pitchFamily="49" charset="0"/>
+              </a:rPr>
+              <a:t> main() {</a:t>
+            </a:r>
+          </a:p>
+          <a:p>
+            <a:r>
+              <a:rPr lang="en-US" sz="3600" dirty="0">
+                <a:solidFill>
+                  <a:schemeClr val="bg1"/>
+                </a:solidFill>
+                <a:latin typeface="Roboto Mono" panose="00000009000000000000" pitchFamily="49" charset="0"/>
+                <a:ea typeface="Roboto Mono" panose="00000009000000000000" pitchFamily="49" charset="0"/>
+              </a:rPr>
+              <a:t>    let x = 42;</a:t>
+            </a:r>
+          </a:p>
+          <a:p>
+            <a:r>
+              <a:rPr lang="en-US" sz="3600" dirty="0">
+                <a:solidFill>
+                  <a:schemeClr val="bg1"/>
+                </a:solidFill>
+                <a:latin typeface="Roboto Mono" panose="00000009000000000000" pitchFamily="49" charset="0"/>
+                <a:ea typeface="Roboto Mono" panose="00000009000000000000" pitchFamily="49" charset="0"/>
+              </a:rPr>
+              <a:t>    let </a:t>
+            </a:r>
+            <a:r>
+              <a:rPr lang="en-US" sz="3600" dirty="0" err="1">
+                <a:solidFill>
+                  <a:schemeClr val="bg1"/>
+                </a:solidFill>
+                <a:latin typeface="Roboto Mono" panose="00000009000000000000" pitchFamily="49" charset="0"/>
+                <a:ea typeface="Roboto Mono" panose="00000009000000000000" pitchFamily="49" charset="0"/>
+              </a:rPr>
+              <a:t>raw_ptr</a:t>
+            </a:r>
+            <a:r>
+              <a:rPr lang="en-US" sz="3600" dirty="0">
+                <a:solidFill>
+                  <a:schemeClr val="bg1"/>
+                </a:solidFill>
+                <a:latin typeface="Roboto Mono" panose="00000009000000000000" pitchFamily="49" charset="0"/>
+                <a:ea typeface="Roboto Mono" panose="00000009000000000000" pitchFamily="49" charset="0"/>
+              </a:rPr>
+              <a:t>: *const i32 = &amp;x;</a:t>
+            </a:r>
+          </a:p>
+          <a:p>
+            <a:r>
+              <a:rPr lang="en-US" sz="3600" dirty="0">
+                <a:solidFill>
+                  <a:schemeClr val="bg1"/>
+                </a:solidFill>
+                <a:latin typeface="Roboto Mono" panose="00000009000000000000" pitchFamily="49" charset="0"/>
+                <a:ea typeface="Roboto Mono" panose="00000009000000000000" pitchFamily="49" charset="0"/>
+              </a:rPr>
+              <a:t>    let reference = &amp;x;</a:t>
+            </a:r>
+          </a:p>
+          <a:p>
+            <a:r>
+              <a:rPr lang="en-US" sz="3600" dirty="0">
+                <a:solidFill>
+                  <a:schemeClr val="bg1"/>
+                </a:solidFill>
+                <a:latin typeface="Roboto Mono" panose="00000009000000000000" pitchFamily="49" charset="0"/>
+                <a:ea typeface="Roboto Mono" panose="00000009000000000000" pitchFamily="49" charset="0"/>
+              </a:rPr>
+              <a:t>        </a:t>
+            </a:r>
+          </a:p>
+          <a:p>
+            <a:r>
+              <a:rPr lang="en-US" sz="3600" dirty="0">
+                <a:solidFill>
+                  <a:schemeClr val="bg1"/>
+                </a:solidFill>
+                <a:latin typeface="Roboto Mono" panose="00000009000000000000" pitchFamily="49" charset="0"/>
+                <a:ea typeface="Roboto Mono" panose="00000009000000000000" pitchFamily="49" charset="0"/>
+              </a:rPr>
+              <a:t>    </a:t>
+            </a:r>
+            <a:r>
+              <a:rPr lang="en-US" sz="3600" dirty="0" err="1">
+                <a:solidFill>
+                  <a:schemeClr val="bg1"/>
+                </a:solidFill>
+                <a:latin typeface="Roboto Mono" panose="00000009000000000000" pitchFamily="49" charset="0"/>
+                <a:ea typeface="Roboto Mono" panose="00000009000000000000" pitchFamily="49" charset="0"/>
+              </a:rPr>
+              <a:t>println</a:t>
+            </a:r>
+            <a:r>
+              <a:rPr lang="en-US" sz="3600" dirty="0">
+                <a:solidFill>
+                  <a:schemeClr val="bg1"/>
+                </a:solidFill>
+                <a:latin typeface="Roboto Mono" panose="00000009000000000000" pitchFamily="49" charset="0"/>
+                <a:ea typeface="Roboto Mono" panose="00000009000000000000" pitchFamily="49" charset="0"/>
+              </a:rPr>
+              <a:t>!("x lives at: {:p}", &amp;x);</a:t>
+            </a:r>
+          </a:p>
+          <a:p>
+            <a:r>
+              <a:rPr lang="en-US" sz="3600" dirty="0">
+                <a:solidFill>
+                  <a:schemeClr val="bg1"/>
+                </a:solidFill>
+                <a:latin typeface="Roboto Mono" panose="00000009000000000000" pitchFamily="49" charset="0"/>
+                <a:ea typeface="Roboto Mono" panose="00000009000000000000" pitchFamily="49" charset="0"/>
+              </a:rPr>
+              <a:t>    </a:t>
+            </a:r>
+            <a:r>
+              <a:rPr lang="en-US" sz="3600" dirty="0" err="1">
+                <a:solidFill>
+                  <a:schemeClr val="bg1"/>
+                </a:solidFill>
+                <a:latin typeface="Roboto Mono" panose="00000009000000000000" pitchFamily="49" charset="0"/>
+                <a:ea typeface="Roboto Mono" panose="00000009000000000000" pitchFamily="49" charset="0"/>
+              </a:rPr>
+              <a:t>println</a:t>
+            </a:r>
+            <a:r>
+              <a:rPr lang="en-US" sz="3600" dirty="0">
+                <a:solidFill>
+                  <a:schemeClr val="bg1"/>
+                </a:solidFill>
+                <a:latin typeface="Roboto Mono" panose="00000009000000000000" pitchFamily="49" charset="0"/>
+                <a:ea typeface="Roboto Mono" panose="00000009000000000000" pitchFamily="49" charset="0"/>
+              </a:rPr>
+              <a:t>!("raw pointer: {:p}", </a:t>
+            </a:r>
+            <a:r>
+              <a:rPr lang="en-US" sz="3600" dirty="0" err="1">
+                <a:solidFill>
+                  <a:schemeClr val="bg1"/>
+                </a:solidFill>
+                <a:latin typeface="Roboto Mono" panose="00000009000000000000" pitchFamily="49" charset="0"/>
+                <a:ea typeface="Roboto Mono" panose="00000009000000000000" pitchFamily="49" charset="0"/>
+              </a:rPr>
+              <a:t>raw_ptr</a:t>
+            </a:r>
+            <a:r>
+              <a:rPr lang="en-US" sz="3600" dirty="0">
+                <a:solidFill>
+                  <a:schemeClr val="bg1"/>
+                </a:solidFill>
+                <a:latin typeface="Roboto Mono" panose="00000009000000000000" pitchFamily="49" charset="0"/>
+                <a:ea typeface="Roboto Mono" panose="00000009000000000000" pitchFamily="49" charset="0"/>
+              </a:rPr>
+              <a:t>);</a:t>
+            </a:r>
+          </a:p>
+          <a:p>
+            <a:r>
+              <a:rPr lang="en-US" sz="3600" dirty="0">
+                <a:solidFill>
+                  <a:schemeClr val="bg1"/>
+                </a:solidFill>
+                <a:latin typeface="Roboto Mono" panose="00000009000000000000" pitchFamily="49" charset="0"/>
+                <a:ea typeface="Roboto Mono" panose="00000009000000000000" pitchFamily="49" charset="0"/>
+              </a:rPr>
+              <a:t>    </a:t>
+            </a:r>
+            <a:r>
+              <a:rPr lang="en-US" sz="3600" dirty="0" err="1">
+                <a:solidFill>
+                  <a:schemeClr val="bg1"/>
+                </a:solidFill>
+                <a:latin typeface="Roboto Mono" panose="00000009000000000000" pitchFamily="49" charset="0"/>
+                <a:ea typeface="Roboto Mono" panose="00000009000000000000" pitchFamily="49" charset="0"/>
+              </a:rPr>
+              <a:t>println</a:t>
+            </a:r>
+            <a:r>
+              <a:rPr lang="en-US" sz="3600" dirty="0">
+                <a:solidFill>
+                  <a:schemeClr val="bg1"/>
+                </a:solidFill>
+                <a:latin typeface="Roboto Mono" panose="00000009000000000000" pitchFamily="49" charset="0"/>
+                <a:ea typeface="Roboto Mono" panose="00000009000000000000" pitchFamily="49" charset="0"/>
+              </a:rPr>
+              <a:t>!("reference: {:p}", reference);</a:t>
+            </a:r>
+          </a:p>
+          <a:p>
+            <a:r>
+              <a:rPr lang="en-US" sz="3600" dirty="0">
+                <a:solidFill>
+                  <a:schemeClr val="bg1"/>
+                </a:solidFill>
+                <a:latin typeface="Roboto Mono" panose="00000009000000000000" pitchFamily="49" charset="0"/>
+                <a:ea typeface="Roboto Mono" panose="00000009000000000000" pitchFamily="49" charset="0"/>
+              </a:rPr>
+              <a:t>}</a:t>
+            </a:r>
+          </a:p>
+        </p:txBody>
+      </p:sp>
+    </p:spTree>
+    <p:extLst>
+      <p:ext uri="{BB962C8B-B14F-4D97-AF65-F5344CB8AC3E}">
+        <p14:creationId xmlns:p14="http://schemas.microsoft.com/office/powerpoint/2010/main" val="3572421801"/>
+      </p:ext>
+    </p:extLst>
+  </p:cSld>
+  <p:clrMapOvr>
+    <a:masterClrMapping/>
+  </p:clrMapOvr>
+  <mc:AlternateContent xmlns:mc="http://schemas.openxmlformats.org/markup-compatibility/2006" xmlns:p14="http://schemas.microsoft.com/office/powerpoint/2010/main">
+    <mc:Choice Requires="p14">
+      <p:transition spd="med" p14:dur="700">
+        <p:fade/>
+      </p:transition>
+    </mc:Choice>
+    <mc:Fallback xmlns="">
+      <p:transition spd="med">
+        <p:fade/>
+      </p:transition>
+    </mc:Fallback>
+  </mc:AlternateContent>
+</p:sld>
+</file>
+
+<file path=ppt/slides/slide16.xml><?xml version="1.0" encoding="utf-8"?>
+<p:sld xmlns:a="http://schemas.openxmlformats.org/drawingml/2006/main" xmlns:r="http://schemas.openxmlformats.org/officeDocument/2006/relationships" xmlns:p="http://schemas.openxmlformats.org/presentationml/2006/main">
+  <p:cSld>
+    <p:spTree>
+      <p:nvGrpSpPr>
+        <p:cNvPr id="1" name="">
+          <a:extLst>
+            <a:ext uri="{FF2B5EF4-FFF2-40B4-BE49-F238E27FC236}">
+              <a16:creationId xmlns:a16="http://schemas.microsoft.com/office/drawing/2014/main" id="{FEF78D95-E459-A216-FF18-C9B5B210105D}"/>
+            </a:ext>
+          </a:extLst>
+        </p:cNvPr>
+        <p:cNvGrpSpPr/>
+        <p:nvPr/>
+      </p:nvGrpSpPr>
+      <p:grpSpPr>
+        <a:xfrm>
+          <a:off x="0" y="0"/>
+          <a:ext cx="0" cy="0"/>
+          <a:chOff x="0" y="0"/>
+          <a:chExt cx="0" cy="0"/>
+        </a:xfrm>
+      </p:grpSpPr>
+      <p:sp>
+        <p:nvSpPr>
+          <p:cNvPr id="4" name="Title 1">
+            <a:extLst>
+              <a:ext uri="{FF2B5EF4-FFF2-40B4-BE49-F238E27FC236}">
+                <a16:creationId xmlns:a16="http://schemas.microsoft.com/office/drawing/2014/main" id="{720E8692-C7C6-593C-0A35-C35A827087E1}"/>
+              </a:ext>
+            </a:extLst>
+          </p:cNvPr>
+          <p:cNvSpPr>
+            <a:spLocks noGrp="1"/>
+          </p:cNvSpPr>
+          <p:nvPr>
+            <p:ph type="title"/>
+          </p:nvPr>
+        </p:nvSpPr>
+        <p:spPr>
+          <a:xfrm>
+            <a:off x="1257300" y="0"/>
+            <a:ext cx="15773400" cy="1988345"/>
+          </a:xfrm>
+        </p:spPr>
+        <p:txBody>
+          <a:bodyPr/>
+          <a:lstStyle/>
+          <a:p>
+            <a:pPr algn="ctr"/>
+            <a:r>
+              <a:rPr lang="en-US" dirty="0"/>
+              <a:t>Pointers and References</a:t>
+            </a:r>
+          </a:p>
+        </p:txBody>
+      </p:sp>
+      <p:sp>
+        <p:nvSpPr>
+          <p:cNvPr id="3" name="TextBox 2">
+            <a:extLst>
+              <a:ext uri="{FF2B5EF4-FFF2-40B4-BE49-F238E27FC236}">
+                <a16:creationId xmlns:a16="http://schemas.microsoft.com/office/drawing/2014/main" id="{EFED817C-C9A3-1113-71FC-A132687B5167}"/>
+              </a:ext>
+            </a:extLst>
+          </p:cNvPr>
+          <p:cNvSpPr txBox="1"/>
+          <p:nvPr/>
+        </p:nvSpPr>
+        <p:spPr>
+          <a:xfrm>
+            <a:off x="2423233" y="3223281"/>
+            <a:ext cx="13441533" cy="5078313"/>
+          </a:xfrm>
+          <a:prstGeom prst="rect">
+            <a:avLst/>
+          </a:prstGeom>
+          <a:noFill/>
+        </p:spPr>
+        <p:txBody>
+          <a:bodyPr wrap="square">
+            <a:spAutoFit/>
+          </a:bodyPr>
+          <a:lstStyle/>
+          <a:p>
+            <a:r>
+              <a:rPr lang="en-US" sz="3600" dirty="0" err="1">
+                <a:solidFill>
+                  <a:schemeClr val="bg1"/>
+                </a:solidFill>
+                <a:latin typeface="Roboto Mono" panose="00000009000000000000" pitchFamily="49" charset="0"/>
+                <a:ea typeface="Roboto Mono" panose="00000009000000000000" pitchFamily="49" charset="0"/>
+              </a:rPr>
+              <a:t>fn</a:t>
+            </a:r>
+            <a:r>
+              <a:rPr lang="en-US" sz="3600" dirty="0">
+                <a:solidFill>
+                  <a:schemeClr val="bg1"/>
+                </a:solidFill>
+                <a:latin typeface="Roboto Mono" panose="00000009000000000000" pitchFamily="49" charset="0"/>
+                <a:ea typeface="Roboto Mono" panose="00000009000000000000" pitchFamily="49" charset="0"/>
+              </a:rPr>
+              <a:t> main() {</a:t>
+            </a:r>
+          </a:p>
+          <a:p>
+            <a:r>
+              <a:rPr lang="en-US" sz="3600" dirty="0">
+                <a:solidFill>
+                  <a:schemeClr val="bg1"/>
+                </a:solidFill>
+                <a:latin typeface="Roboto Mono" panose="00000009000000000000" pitchFamily="49" charset="0"/>
+                <a:ea typeface="Roboto Mono" panose="00000009000000000000" pitchFamily="49" charset="0"/>
+              </a:rPr>
+              <a:t>    let x = 42;</a:t>
+            </a:r>
+          </a:p>
+          <a:p>
+            <a:r>
+              <a:rPr lang="en-US" sz="3600" dirty="0">
+                <a:solidFill>
+                  <a:schemeClr val="bg1"/>
+                </a:solidFill>
+                <a:latin typeface="Roboto Mono" panose="00000009000000000000" pitchFamily="49" charset="0"/>
+                <a:ea typeface="Roboto Mono" panose="00000009000000000000" pitchFamily="49" charset="0"/>
+              </a:rPr>
+              <a:t>    let </a:t>
+            </a:r>
+            <a:r>
+              <a:rPr lang="en-US" sz="3600" dirty="0" err="1">
+                <a:solidFill>
+                  <a:schemeClr val="bg1"/>
+                </a:solidFill>
+                <a:latin typeface="Roboto Mono" panose="00000009000000000000" pitchFamily="49" charset="0"/>
+                <a:ea typeface="Roboto Mono" panose="00000009000000000000" pitchFamily="49" charset="0"/>
+              </a:rPr>
+              <a:t>raw_ptr</a:t>
+            </a:r>
+            <a:r>
+              <a:rPr lang="en-US" sz="3600" dirty="0">
+                <a:solidFill>
+                  <a:schemeClr val="bg1"/>
+                </a:solidFill>
+                <a:latin typeface="Roboto Mono" panose="00000009000000000000" pitchFamily="49" charset="0"/>
+                <a:ea typeface="Roboto Mono" panose="00000009000000000000" pitchFamily="49" charset="0"/>
+              </a:rPr>
+              <a:t>: *const i32 = &amp;x;</a:t>
+            </a:r>
+          </a:p>
+          <a:p>
+            <a:r>
+              <a:rPr lang="en-US" sz="3600" dirty="0">
+                <a:solidFill>
+                  <a:schemeClr val="bg1"/>
+                </a:solidFill>
+                <a:latin typeface="Roboto Mono" panose="00000009000000000000" pitchFamily="49" charset="0"/>
+                <a:ea typeface="Roboto Mono" panose="00000009000000000000" pitchFamily="49" charset="0"/>
+              </a:rPr>
+              <a:t>    let reference = &amp;x;</a:t>
+            </a:r>
+          </a:p>
+          <a:p>
+            <a:r>
+              <a:rPr lang="en-US" sz="3600" dirty="0">
+                <a:solidFill>
+                  <a:schemeClr val="bg1"/>
+                </a:solidFill>
+                <a:latin typeface="Roboto Mono" panose="00000009000000000000" pitchFamily="49" charset="0"/>
+                <a:ea typeface="Roboto Mono" panose="00000009000000000000" pitchFamily="49" charset="0"/>
+              </a:rPr>
+              <a:t>        </a:t>
+            </a:r>
+          </a:p>
+          <a:p>
+            <a:r>
+              <a:rPr lang="en-US" sz="3600" dirty="0">
+                <a:solidFill>
+                  <a:schemeClr val="bg1"/>
+                </a:solidFill>
+                <a:latin typeface="Roboto Mono" panose="00000009000000000000" pitchFamily="49" charset="0"/>
+                <a:ea typeface="Roboto Mono" panose="00000009000000000000" pitchFamily="49" charset="0"/>
+              </a:rPr>
+              <a:t>    </a:t>
+            </a:r>
+            <a:r>
+              <a:rPr lang="en-US" sz="3600" dirty="0" err="1">
+                <a:solidFill>
+                  <a:schemeClr val="bg1"/>
+                </a:solidFill>
+                <a:latin typeface="Roboto Mono" panose="00000009000000000000" pitchFamily="49" charset="0"/>
+                <a:ea typeface="Roboto Mono" panose="00000009000000000000" pitchFamily="49" charset="0"/>
+              </a:rPr>
+              <a:t>println</a:t>
+            </a:r>
+            <a:r>
+              <a:rPr lang="en-US" sz="3600" dirty="0">
+                <a:solidFill>
+                  <a:schemeClr val="bg1"/>
+                </a:solidFill>
+                <a:latin typeface="Roboto Mono" panose="00000009000000000000" pitchFamily="49" charset="0"/>
+                <a:ea typeface="Roboto Mono" panose="00000009000000000000" pitchFamily="49" charset="0"/>
+              </a:rPr>
+              <a:t>!("x lives at: {:p}", &amp;x);</a:t>
+            </a:r>
+          </a:p>
+          <a:p>
+            <a:r>
+              <a:rPr lang="en-US" sz="3600" dirty="0">
+                <a:solidFill>
+                  <a:schemeClr val="bg1"/>
+                </a:solidFill>
+                <a:latin typeface="Roboto Mono" panose="00000009000000000000" pitchFamily="49" charset="0"/>
+                <a:ea typeface="Roboto Mono" panose="00000009000000000000" pitchFamily="49" charset="0"/>
+              </a:rPr>
+              <a:t>    </a:t>
+            </a:r>
+            <a:r>
+              <a:rPr lang="en-US" sz="3600" dirty="0" err="1">
+                <a:solidFill>
+                  <a:schemeClr val="bg1"/>
+                </a:solidFill>
+                <a:latin typeface="Roboto Mono" panose="00000009000000000000" pitchFamily="49" charset="0"/>
+                <a:ea typeface="Roboto Mono" panose="00000009000000000000" pitchFamily="49" charset="0"/>
+              </a:rPr>
+              <a:t>println</a:t>
+            </a:r>
+            <a:r>
+              <a:rPr lang="en-US" sz="3600" dirty="0">
+                <a:solidFill>
+                  <a:schemeClr val="bg1"/>
+                </a:solidFill>
+                <a:latin typeface="Roboto Mono" panose="00000009000000000000" pitchFamily="49" charset="0"/>
+                <a:ea typeface="Roboto Mono" panose="00000009000000000000" pitchFamily="49" charset="0"/>
+              </a:rPr>
+              <a:t>!("raw pointer: {:p}", </a:t>
+            </a:r>
+            <a:r>
+              <a:rPr lang="en-US" sz="3600" dirty="0" err="1">
+                <a:solidFill>
+                  <a:schemeClr val="bg1"/>
+                </a:solidFill>
+                <a:latin typeface="Roboto Mono" panose="00000009000000000000" pitchFamily="49" charset="0"/>
+                <a:ea typeface="Roboto Mono" panose="00000009000000000000" pitchFamily="49" charset="0"/>
+              </a:rPr>
+              <a:t>raw_ptr</a:t>
+            </a:r>
+            <a:r>
+              <a:rPr lang="en-US" sz="3600" dirty="0">
+                <a:solidFill>
+                  <a:schemeClr val="bg1"/>
+                </a:solidFill>
+                <a:latin typeface="Roboto Mono" panose="00000009000000000000" pitchFamily="49" charset="0"/>
+                <a:ea typeface="Roboto Mono" panose="00000009000000000000" pitchFamily="49" charset="0"/>
+              </a:rPr>
+              <a:t>);</a:t>
+            </a:r>
+          </a:p>
+          <a:p>
+            <a:r>
+              <a:rPr lang="en-US" sz="3600" dirty="0">
+                <a:solidFill>
+                  <a:schemeClr val="bg1"/>
+                </a:solidFill>
+                <a:latin typeface="Roboto Mono" panose="00000009000000000000" pitchFamily="49" charset="0"/>
+                <a:ea typeface="Roboto Mono" panose="00000009000000000000" pitchFamily="49" charset="0"/>
+              </a:rPr>
+              <a:t>    </a:t>
+            </a:r>
+            <a:r>
+              <a:rPr lang="en-US" sz="3600" dirty="0" err="1">
+                <a:solidFill>
+                  <a:schemeClr val="bg1"/>
+                </a:solidFill>
+                <a:latin typeface="Roboto Mono" panose="00000009000000000000" pitchFamily="49" charset="0"/>
+                <a:ea typeface="Roboto Mono" panose="00000009000000000000" pitchFamily="49" charset="0"/>
+              </a:rPr>
+              <a:t>println</a:t>
+            </a:r>
+            <a:r>
+              <a:rPr lang="en-US" sz="3600" dirty="0">
+                <a:solidFill>
+                  <a:schemeClr val="bg1"/>
+                </a:solidFill>
+                <a:latin typeface="Roboto Mono" panose="00000009000000000000" pitchFamily="49" charset="0"/>
+                <a:ea typeface="Roboto Mono" panose="00000009000000000000" pitchFamily="49" charset="0"/>
+              </a:rPr>
+              <a:t>!("reference: {:p}", reference);</a:t>
+            </a:r>
+          </a:p>
+          <a:p>
+            <a:r>
+              <a:rPr lang="en-US" sz="3600" dirty="0">
+                <a:solidFill>
+                  <a:schemeClr val="bg1"/>
+                </a:solidFill>
+                <a:latin typeface="Roboto Mono" panose="00000009000000000000" pitchFamily="49" charset="0"/>
+                <a:ea typeface="Roboto Mono" panose="00000009000000000000" pitchFamily="49" charset="0"/>
+              </a:rPr>
+              <a:t>}</a:t>
+            </a:r>
+          </a:p>
+        </p:txBody>
+      </p:sp>
+      <p:cxnSp>
+        <p:nvCxnSpPr>
+          <p:cNvPr id="5" name="Straight Connector 4">
+            <a:extLst>
+              <a:ext uri="{FF2B5EF4-FFF2-40B4-BE49-F238E27FC236}">
+                <a16:creationId xmlns:a16="http://schemas.microsoft.com/office/drawing/2014/main" id="{12B2EFBE-DE17-AE20-1E51-D85F701FA877}"/>
+              </a:ext>
+            </a:extLst>
+          </p:cNvPr>
+          <p:cNvCxnSpPr/>
+          <p:nvPr/>
+        </p:nvCxnSpPr>
+        <p:spPr>
+          <a:xfrm>
+            <a:off x="3566221" y="4657730"/>
+            <a:ext cx="8138071" cy="0"/>
+          </a:xfrm>
+          <a:prstGeom prst="line">
+            <a:avLst/>
+          </a:prstGeom>
+          <a:ln w="57150">
+            <a:solidFill>
+              <a:srgbClr val="FF2100"/>
+            </a:solidFill>
+          </a:ln>
+        </p:spPr>
+        <p:style>
+          <a:lnRef idx="1">
+            <a:schemeClr val="accent1"/>
+          </a:lnRef>
+          <a:fillRef idx="0">
+            <a:schemeClr val="accent1"/>
+          </a:fillRef>
+          <a:effectRef idx="0">
+            <a:schemeClr val="accent1"/>
+          </a:effectRef>
+          <a:fontRef idx="minor">
+            <a:schemeClr val="tx1"/>
+          </a:fontRef>
+        </p:style>
+      </p:cxnSp>
+      <p:cxnSp>
+        <p:nvCxnSpPr>
+          <p:cNvPr id="6" name="Straight Connector 5">
+            <a:extLst>
+              <a:ext uri="{FF2B5EF4-FFF2-40B4-BE49-F238E27FC236}">
+                <a16:creationId xmlns:a16="http://schemas.microsoft.com/office/drawing/2014/main" id="{B232D7BC-24CF-B3F9-3463-C1E422E92C6B}"/>
+              </a:ext>
+            </a:extLst>
+          </p:cNvPr>
+          <p:cNvCxnSpPr>
+            <a:cxnSpLocks/>
+          </p:cNvCxnSpPr>
+          <p:nvPr/>
+        </p:nvCxnSpPr>
+        <p:spPr>
+          <a:xfrm>
+            <a:off x="3566221" y="6848480"/>
+            <a:ext cx="10881241" cy="0"/>
+          </a:xfrm>
+          <a:prstGeom prst="line">
+            <a:avLst/>
+          </a:prstGeom>
+          <a:ln w="57150">
+            <a:solidFill>
+              <a:srgbClr val="FF2100"/>
+            </a:solidFill>
+          </a:ln>
+        </p:spPr>
+        <p:style>
+          <a:lnRef idx="1">
+            <a:schemeClr val="accent1"/>
+          </a:lnRef>
+          <a:fillRef idx="0">
+            <a:schemeClr val="accent1"/>
+          </a:fillRef>
+          <a:effectRef idx="0">
+            <a:schemeClr val="accent1"/>
+          </a:effectRef>
+          <a:fontRef idx="minor">
+            <a:schemeClr val="tx1"/>
+          </a:fontRef>
+        </p:style>
+      </p:cxnSp>
+    </p:spTree>
+    <p:extLst>
+      <p:ext uri="{BB962C8B-B14F-4D97-AF65-F5344CB8AC3E}">
+        <p14:creationId xmlns:p14="http://schemas.microsoft.com/office/powerpoint/2010/main" val="553833050"/>
+      </p:ext>
+    </p:extLst>
+  </p:cSld>
+  <p:clrMapOvr>
+    <a:masterClrMapping/>
+  </p:clrMapOvr>
+  <mc:AlternateContent xmlns:mc="http://schemas.openxmlformats.org/markup-compatibility/2006">
+    <mc:Choice xmlns:p14="http://schemas.microsoft.com/office/powerpoint/2010/main" Requires="p14">
+      <p:transition spd="med" p14:dur="700">
+        <p:fade/>
+      </p:transition>
+    </mc:Choice>
+    <mc:Fallback>
+      <p:transition spd="med">
+        <p:fade/>
+      </p:transition>
+    </mc:Fallback>
+  </mc:AlternateContent>
+</p:sld>
+</file>
+
+<file path=ppt/slides/slide17.xml><?xml version="1.0" encoding="utf-8"?>
+<p:sld xmlns:a="http://schemas.openxmlformats.org/drawingml/2006/main" xmlns:r="http://schemas.openxmlformats.org/officeDocument/2006/relationships" xmlns:p="http://schemas.openxmlformats.org/presentationml/2006/main">
+  <p:cSld>
+    <p:spTree>
+      <p:nvGrpSpPr>
+        <p:cNvPr id="1" name="">
+          <a:extLst>
+            <a:ext uri="{FF2B5EF4-FFF2-40B4-BE49-F238E27FC236}">
+              <a16:creationId xmlns:a16="http://schemas.microsoft.com/office/drawing/2014/main" id="{E46FBA85-FC47-AB86-9C8A-68EB4936E119}"/>
+            </a:ext>
+          </a:extLst>
+        </p:cNvPr>
+        <p:cNvGrpSpPr/>
+        <p:nvPr/>
+      </p:nvGrpSpPr>
+      <p:grpSpPr>
+        <a:xfrm>
+          <a:off x="0" y="0"/>
+          <a:ext cx="0" cy="0"/>
+          <a:chOff x="0" y="0"/>
+          <a:chExt cx="0" cy="0"/>
+        </a:xfrm>
+      </p:grpSpPr>
+      <p:pic>
+        <p:nvPicPr>
+          <p:cNvPr id="3" name="Picture 2">
+            <a:extLst>
+              <a:ext uri="{FF2B5EF4-FFF2-40B4-BE49-F238E27FC236}">
+                <a16:creationId xmlns:a16="http://schemas.microsoft.com/office/drawing/2014/main" id="{ED54B053-9AF0-3B97-EE01-B7E5C8C54D32}"/>
+              </a:ext>
+            </a:extLst>
+          </p:cNvPr>
+          <p:cNvPicPr>
+            <a:picLocks noChangeAspect="1"/>
+          </p:cNvPicPr>
+          <p:nvPr/>
+        </p:nvPicPr>
+        <p:blipFill>
+          <a:blip r:embed="rId2">
+            <a:extLst>
+              <a:ext uri="{28A0092B-C50C-407E-A947-70E740481C1C}">
+                <a14:useLocalDpi xmlns:a14="http://schemas.microsoft.com/office/drawing/2010/main" val="0"/>
+              </a:ext>
+            </a:extLst>
+          </a:blip>
+          <a:stretch>
+            <a:fillRect/>
+          </a:stretch>
+        </p:blipFill>
+        <p:spPr>
+          <a:xfrm>
+            <a:off x="4590414" y="589914"/>
+            <a:ext cx="9107171" cy="9107171"/>
+          </a:xfrm>
+          <a:prstGeom prst="rect">
+            <a:avLst/>
+          </a:prstGeom>
+        </p:spPr>
+      </p:pic>
+    </p:spTree>
+    <p:extLst>
+      <p:ext uri="{BB962C8B-B14F-4D97-AF65-F5344CB8AC3E}">
+        <p14:creationId xmlns:p14="http://schemas.microsoft.com/office/powerpoint/2010/main" val="224380544"/>
+      </p:ext>
+    </p:extLst>
+  </p:cSld>
+  <p:clrMapOvr>
+    <a:masterClrMapping/>
+  </p:clrMapOvr>
+  <mc:AlternateContent xmlns:mc="http://schemas.openxmlformats.org/markup-compatibility/2006" xmlns:p14="http://schemas.microsoft.com/office/powerpoint/2010/main">
+    <mc:Choice Requires="p14">
+      <p:transition spd="med" p14:dur="700">
+        <p:fade/>
+      </p:transition>
+    </mc:Choice>
+    <mc:Fallback xmlns="">
+      <p:transition spd="med">
+        <p:fade/>
+      </p:transition>
+    </mc:Fallback>
+  </mc:AlternateContent>
+</p:sld>
+</file>
+
+<file path=ppt/slides/slide18.xml><?xml version="1.0" encoding="utf-8"?>
+<p:sld xmlns:a="http://schemas.openxmlformats.org/drawingml/2006/main" xmlns:r="http://schemas.openxmlformats.org/officeDocument/2006/relationships" xmlns:p="http://schemas.openxmlformats.org/presentationml/2006/main">
+  <p:cSld>
+    <p:spTree>
+      <p:nvGrpSpPr>
+        <p:cNvPr id="1" name="">
+          <a:extLst>
+            <a:ext uri="{FF2B5EF4-FFF2-40B4-BE49-F238E27FC236}">
+              <a16:creationId xmlns:a16="http://schemas.microsoft.com/office/drawing/2014/main" id="{EE4F1330-1900-2CF5-FED6-D0068DC10B79}"/>
+            </a:ext>
+          </a:extLst>
+        </p:cNvPr>
+        <p:cNvGrpSpPr/>
+        <p:nvPr/>
+      </p:nvGrpSpPr>
+      <p:grpSpPr>
+        <a:xfrm>
+          <a:off x="0" y="0"/>
+          <a:ext cx="0" cy="0"/>
+          <a:chOff x="0" y="0"/>
+          <a:chExt cx="0" cy="0"/>
+        </a:xfrm>
+      </p:grpSpPr>
+      <p:sp>
+        <p:nvSpPr>
+          <p:cNvPr id="4" name="Title 1">
+            <a:extLst>
+              <a:ext uri="{FF2B5EF4-FFF2-40B4-BE49-F238E27FC236}">
+                <a16:creationId xmlns:a16="http://schemas.microsoft.com/office/drawing/2014/main" id="{1FBDD01B-EB41-6941-AEE0-85BF3E237CC1}"/>
+              </a:ext>
+            </a:extLst>
+          </p:cNvPr>
+          <p:cNvSpPr>
+            <a:spLocks noGrp="1"/>
+          </p:cNvSpPr>
+          <p:nvPr>
+            <p:ph type="title"/>
+          </p:nvPr>
+        </p:nvSpPr>
+        <p:spPr>
+          <a:xfrm>
+            <a:off x="1257300" y="0"/>
+            <a:ext cx="15773400" cy="1988345"/>
+          </a:xfrm>
+        </p:spPr>
+        <p:txBody>
+          <a:bodyPr/>
+          <a:lstStyle/>
+          <a:p>
+            <a:pPr algn="ctr"/>
+            <a:r>
+              <a:rPr lang="en-US" dirty="0"/>
+              <a:t>Pointers and References</a:t>
+            </a:r>
+          </a:p>
+        </p:txBody>
+      </p:sp>
+      <p:sp>
+        <p:nvSpPr>
+          <p:cNvPr id="2" name="TextBox 1">
+            <a:extLst>
+              <a:ext uri="{FF2B5EF4-FFF2-40B4-BE49-F238E27FC236}">
+                <a16:creationId xmlns:a16="http://schemas.microsoft.com/office/drawing/2014/main" id="{43AD3FED-67C6-3700-9F12-5E733D6EBE31}"/>
+              </a:ext>
+            </a:extLst>
+          </p:cNvPr>
+          <p:cNvSpPr txBox="1"/>
+          <p:nvPr/>
+        </p:nvSpPr>
+        <p:spPr>
+          <a:xfrm>
+            <a:off x="5852196" y="2950241"/>
+            <a:ext cx="6812206" cy="2308324"/>
+          </a:xfrm>
+          <a:prstGeom prst="rect">
+            <a:avLst/>
+          </a:prstGeom>
+          <a:noFill/>
+        </p:spPr>
+        <p:txBody>
+          <a:bodyPr wrap="square">
+            <a:spAutoFit/>
+          </a:bodyPr>
+          <a:lstStyle/>
+          <a:p>
+            <a:r>
+              <a:rPr lang="en-US" sz="3600" dirty="0">
+                <a:solidFill>
+                  <a:schemeClr val="bg1"/>
+                </a:solidFill>
+                <a:latin typeface="Roboto Mono" panose="00000009000000000000" pitchFamily="49" charset="0"/>
+                <a:ea typeface="Roboto Mono" panose="00000009000000000000" pitchFamily="49" charset="0"/>
+              </a:rPr>
+              <a:t>struct </a:t>
+            </a:r>
+            <a:r>
+              <a:rPr lang="en-US" sz="3600" dirty="0" err="1">
+                <a:solidFill>
+                  <a:schemeClr val="bg1"/>
+                </a:solidFill>
+                <a:latin typeface="Roboto Mono" panose="00000009000000000000" pitchFamily="49" charset="0"/>
+                <a:ea typeface="Roboto Mono" panose="00000009000000000000" pitchFamily="49" charset="0"/>
+              </a:rPr>
+              <a:t>SensorReading</a:t>
+            </a:r>
+            <a:r>
+              <a:rPr lang="en-US" sz="3600" dirty="0">
+                <a:solidFill>
+                  <a:schemeClr val="bg1"/>
+                </a:solidFill>
+                <a:latin typeface="Roboto Mono" panose="00000009000000000000" pitchFamily="49" charset="0"/>
+                <a:ea typeface="Roboto Mono" panose="00000009000000000000" pitchFamily="49" charset="0"/>
+              </a:rPr>
+              <a:t> {</a:t>
+            </a:r>
+          </a:p>
+          <a:p>
+            <a:r>
+              <a:rPr lang="en-US" sz="3600" dirty="0">
+                <a:solidFill>
+                  <a:schemeClr val="bg1"/>
+                </a:solidFill>
+                <a:latin typeface="Roboto Mono" panose="00000009000000000000" pitchFamily="49" charset="0"/>
+                <a:ea typeface="Roboto Mono" panose="00000009000000000000" pitchFamily="49" charset="0"/>
+              </a:rPr>
+              <a:t>    value: u16,</a:t>
+            </a:r>
+          </a:p>
+          <a:p>
+            <a:r>
+              <a:rPr lang="en-US" sz="3600" dirty="0">
+                <a:solidFill>
+                  <a:schemeClr val="bg1"/>
+                </a:solidFill>
+                <a:latin typeface="Roboto Mono" panose="00000009000000000000" pitchFamily="49" charset="0"/>
+                <a:ea typeface="Roboto Mono" panose="00000009000000000000" pitchFamily="49" charset="0"/>
+              </a:rPr>
+              <a:t>    </a:t>
+            </a:r>
+            <a:r>
+              <a:rPr lang="en-US" sz="3600" dirty="0" err="1">
+                <a:solidFill>
+                  <a:schemeClr val="bg1"/>
+                </a:solidFill>
+                <a:latin typeface="Roboto Mono" panose="00000009000000000000" pitchFamily="49" charset="0"/>
+                <a:ea typeface="Roboto Mono" panose="00000009000000000000" pitchFamily="49" charset="0"/>
+              </a:rPr>
+              <a:t>timestamp_ms</a:t>
+            </a:r>
+            <a:r>
+              <a:rPr lang="en-US" sz="3600" dirty="0">
+                <a:solidFill>
+                  <a:schemeClr val="bg1"/>
+                </a:solidFill>
+                <a:latin typeface="Roboto Mono" panose="00000009000000000000" pitchFamily="49" charset="0"/>
+                <a:ea typeface="Roboto Mono" panose="00000009000000000000" pitchFamily="49" charset="0"/>
+              </a:rPr>
+              <a:t>: u32,</a:t>
+            </a:r>
+          </a:p>
+          <a:p>
+            <a:r>
+              <a:rPr lang="en-US" sz="3600" dirty="0">
+                <a:solidFill>
+                  <a:schemeClr val="bg1"/>
+                </a:solidFill>
+                <a:latin typeface="Roboto Mono" panose="00000009000000000000" pitchFamily="49" charset="0"/>
+                <a:ea typeface="Roboto Mono" panose="00000009000000000000" pitchFamily="49" charset="0"/>
+              </a:rPr>
+              <a:t>}</a:t>
+            </a:r>
+          </a:p>
+        </p:txBody>
+      </p:sp>
+      <p:graphicFrame>
+        <p:nvGraphicFramePr>
+          <p:cNvPr id="7" name="Table 6">
+            <a:extLst>
+              <a:ext uri="{FF2B5EF4-FFF2-40B4-BE49-F238E27FC236}">
+                <a16:creationId xmlns:a16="http://schemas.microsoft.com/office/drawing/2014/main" id="{C20CD7E1-47CD-247C-A3FD-FF939E82DA72}"/>
+              </a:ext>
+            </a:extLst>
+          </p:cNvPr>
+          <p:cNvGraphicFramePr>
+            <a:graphicFrameLocks noGrp="1"/>
+          </p:cNvGraphicFramePr>
+          <p:nvPr/>
+        </p:nvGraphicFramePr>
+        <p:xfrm>
+          <a:off x="4291445" y="6972280"/>
+          <a:ext cx="2651732" cy="1371584"/>
+        </p:xfrm>
+        <a:graphic>
+          <a:graphicData uri="http://schemas.openxmlformats.org/drawingml/2006/table">
+            <a:tbl>
+              <a:tblPr firstRow="1" bandRow="1">
+                <a:tableStyleId>{5940675A-B579-460E-94D1-54222C63F5DA}</a:tableStyleId>
+              </a:tblPr>
+              <a:tblGrid>
+                <a:gridCol w="1325866">
+                  <a:extLst>
+                    <a:ext uri="{9D8B030D-6E8A-4147-A177-3AD203B41FA5}">
+                      <a16:colId xmlns:a16="http://schemas.microsoft.com/office/drawing/2014/main" val="3312593263"/>
+                    </a:ext>
+                  </a:extLst>
+                </a:gridCol>
+                <a:gridCol w="1325866">
+                  <a:extLst>
+                    <a:ext uri="{9D8B030D-6E8A-4147-A177-3AD203B41FA5}">
+                      <a16:colId xmlns:a16="http://schemas.microsoft.com/office/drawing/2014/main" val="3262405143"/>
+                    </a:ext>
+                  </a:extLst>
+                </a:gridCol>
+              </a:tblGrid>
+              <a:tr h="685792">
+                <a:tc>
+                  <a:txBody>
+                    <a:bodyPr/>
+                    <a:lstStyle/>
+                    <a:p>
+                      <a:pPr algn="ctr"/>
+                      <a:r>
+                        <a:rPr lang="en-US" b="1" dirty="0">
+                          <a:solidFill>
+                            <a:schemeClr val="bg1"/>
+                          </a:solidFill>
+                          <a:latin typeface="Roboto" panose="02000000000000000000" pitchFamily="2" charset="0"/>
+                          <a:ea typeface="Roboto" panose="02000000000000000000" pitchFamily="2" charset="0"/>
+                        </a:rPr>
+                        <a:t>name</a:t>
+                      </a:r>
+                    </a:p>
+                  </a:txBody>
+                  <a:tcPr anchor="ctr">
+                    <a:lnL w="57150" cap="flat" cmpd="sng" algn="ctr">
+                      <a:solidFill>
+                        <a:schemeClr val="bg1"/>
+                      </a:solidFill>
+                      <a:prstDash val="solid"/>
+                      <a:round/>
+                      <a:headEnd type="none" w="med" len="med"/>
+                      <a:tailEnd type="none" w="med" len="med"/>
+                    </a:lnL>
+                    <a:lnR w="57150" cap="flat" cmpd="sng" algn="ctr">
+                      <a:solidFill>
+                        <a:schemeClr val="bg1"/>
+                      </a:solidFill>
+                      <a:prstDash val="solid"/>
+                      <a:round/>
+                      <a:headEnd type="none" w="med" len="med"/>
+                      <a:tailEnd type="none" w="med" len="med"/>
+                    </a:lnR>
+                    <a:lnT w="57150" cap="flat" cmpd="sng" algn="ctr">
+                      <a:solidFill>
+                        <a:schemeClr val="bg1"/>
+                      </a:solidFill>
+                      <a:prstDash val="solid"/>
+                      <a:round/>
+                      <a:headEnd type="none" w="med" len="med"/>
+                      <a:tailEnd type="none" w="med" len="med"/>
+                    </a:lnT>
+                    <a:lnB w="57150" cap="flat" cmpd="sng" algn="ctr">
+                      <a:solidFill>
+                        <a:schemeClr val="bg1"/>
+                      </a:solidFill>
+                      <a:prstDash val="solid"/>
+                      <a:round/>
+                      <a:headEnd type="none" w="med" len="med"/>
+                      <a:tailEnd type="none" w="med" len="med"/>
+                    </a:lnB>
+                    <a:lnTlToBr w="12700" cmpd="sng">
+                      <a:noFill/>
+                      <a:prstDash val="solid"/>
+                    </a:lnTlToBr>
+                    <a:lnBlToTr w="12700" cmpd="sng">
+                      <a:noFill/>
+                      <a:prstDash val="solid"/>
+                    </a:lnBlToTr>
+                  </a:tcPr>
+                </a:tc>
+                <a:tc>
+                  <a:txBody>
+                    <a:bodyPr/>
+                    <a:lstStyle/>
+                    <a:p>
+                      <a:pPr algn="ctr"/>
+                      <a:r>
+                        <a:rPr lang="en-US" b="1" dirty="0">
+                          <a:solidFill>
+                            <a:schemeClr val="bg1"/>
+                          </a:solidFill>
+                          <a:latin typeface="Roboto" panose="02000000000000000000" pitchFamily="2" charset="0"/>
+                          <a:ea typeface="Roboto" panose="02000000000000000000" pitchFamily="2" charset="0"/>
+                        </a:rPr>
+                        <a:t>value</a:t>
+                      </a:r>
+                    </a:p>
+                  </a:txBody>
+                  <a:tcPr anchor="ctr">
+                    <a:lnL w="57150" cap="flat" cmpd="sng" algn="ctr">
+                      <a:solidFill>
+                        <a:schemeClr val="bg1"/>
+                      </a:solidFill>
+                      <a:prstDash val="solid"/>
+                      <a:round/>
+                      <a:headEnd type="none" w="med" len="med"/>
+                      <a:tailEnd type="none" w="med" len="med"/>
+                    </a:lnL>
+                    <a:lnR w="57150" cap="flat" cmpd="sng" algn="ctr">
+                      <a:solidFill>
+                        <a:schemeClr val="bg1"/>
+                      </a:solidFill>
+                      <a:prstDash val="solid"/>
+                      <a:round/>
+                      <a:headEnd type="none" w="med" len="med"/>
+                      <a:tailEnd type="none" w="med" len="med"/>
+                    </a:lnR>
+                    <a:lnT w="57150" cap="flat" cmpd="sng" algn="ctr">
+                      <a:solidFill>
+                        <a:schemeClr val="bg1"/>
+                      </a:solidFill>
+                      <a:prstDash val="solid"/>
+                      <a:round/>
+                      <a:headEnd type="none" w="med" len="med"/>
+                      <a:tailEnd type="none" w="med" len="med"/>
+                    </a:lnT>
+                    <a:lnB w="57150" cap="flat" cmpd="sng" algn="ctr">
+                      <a:solidFill>
+                        <a:schemeClr val="bg1"/>
+                      </a:solidFill>
+                      <a:prstDash val="solid"/>
+                      <a:round/>
+                      <a:headEnd type="none" w="med" len="med"/>
+                      <a:tailEnd type="none" w="med" len="med"/>
+                    </a:lnB>
+                    <a:lnTlToBr w="12700" cmpd="sng">
+                      <a:noFill/>
+                      <a:prstDash val="solid"/>
+                    </a:lnTlToBr>
+                    <a:lnBlToTr w="12700" cmpd="sng">
+                      <a:noFill/>
+                      <a:prstDash val="solid"/>
+                    </a:lnBlToTr>
+                  </a:tcPr>
+                </a:tc>
+                <a:extLst>
+                  <a:ext uri="{0D108BD9-81ED-4DB2-BD59-A6C34878D82A}">
+                    <a16:rowId xmlns:a16="http://schemas.microsoft.com/office/drawing/2014/main" val="3536993980"/>
+                  </a:ext>
+                </a:extLst>
+              </a:tr>
+              <a:tr h="685792">
+                <a:tc>
+                  <a:txBody>
+                    <a:bodyPr/>
+                    <a:lstStyle/>
+                    <a:p>
+                      <a:pPr algn="ctr"/>
+                      <a:r>
+                        <a:rPr lang="en-US" dirty="0" err="1">
+                          <a:solidFill>
+                            <a:schemeClr val="bg1"/>
+                          </a:solidFill>
+                          <a:latin typeface="Roboto" panose="02000000000000000000" pitchFamily="2" charset="0"/>
+                          <a:ea typeface="Roboto" panose="02000000000000000000" pitchFamily="2" charset="0"/>
+                        </a:rPr>
+                        <a:t>ptr</a:t>
+                      </a:r>
+                      <a:endParaRPr lang="en-US" dirty="0">
+                        <a:solidFill>
+                          <a:schemeClr val="bg1"/>
+                        </a:solidFill>
+                        <a:latin typeface="Roboto" panose="02000000000000000000" pitchFamily="2" charset="0"/>
+                        <a:ea typeface="Roboto" panose="02000000000000000000" pitchFamily="2" charset="0"/>
+                      </a:endParaRPr>
+                    </a:p>
+                  </a:txBody>
+                  <a:tcPr anchor="ctr">
+                    <a:lnL w="57150" cap="flat" cmpd="sng" algn="ctr">
+                      <a:solidFill>
+                        <a:schemeClr val="bg1"/>
+                      </a:solidFill>
+                      <a:prstDash val="solid"/>
+                      <a:round/>
+                      <a:headEnd type="none" w="med" len="med"/>
+                      <a:tailEnd type="none" w="med" len="med"/>
+                    </a:lnL>
+                    <a:lnR w="57150" cap="flat" cmpd="sng" algn="ctr">
+                      <a:solidFill>
+                        <a:schemeClr val="bg1"/>
+                      </a:solidFill>
+                      <a:prstDash val="solid"/>
+                      <a:round/>
+                      <a:headEnd type="none" w="med" len="med"/>
+                      <a:tailEnd type="none" w="med" len="med"/>
+                    </a:lnR>
+                    <a:lnT w="57150" cap="flat" cmpd="sng" algn="ctr">
+                      <a:solidFill>
+                        <a:schemeClr val="bg1"/>
+                      </a:solidFill>
+                      <a:prstDash val="solid"/>
+                      <a:round/>
+                      <a:headEnd type="none" w="med" len="med"/>
+                      <a:tailEnd type="none" w="med" len="med"/>
+                    </a:lnT>
+                    <a:lnB w="57150" cap="flat" cmpd="sng" algn="ctr">
+                      <a:solidFill>
+                        <a:schemeClr val="bg1"/>
+                      </a:solidFill>
+                      <a:prstDash val="solid"/>
+                      <a:round/>
+                      <a:headEnd type="none" w="med" len="med"/>
+                      <a:tailEnd type="none" w="med" len="med"/>
+                    </a:lnB>
+                    <a:lnTlToBr w="12700" cmpd="sng">
+                      <a:noFill/>
+                      <a:prstDash val="solid"/>
+                    </a:lnTlToBr>
+                    <a:lnBlToTr w="12700" cmpd="sng">
+                      <a:noFill/>
+                      <a:prstDash val="solid"/>
+                    </a:lnBlToTr>
+                  </a:tcPr>
+                </a:tc>
+                <a:tc>
+                  <a:txBody>
+                    <a:bodyPr/>
+                    <a:lstStyle/>
+                    <a:p>
+                      <a:pPr algn="ctr"/>
+                      <a:endParaRPr lang="en-US" dirty="0">
+                        <a:solidFill>
+                          <a:schemeClr val="bg1"/>
+                        </a:solidFill>
+                        <a:latin typeface="Roboto" panose="02000000000000000000" pitchFamily="2" charset="0"/>
+                        <a:ea typeface="Roboto" panose="02000000000000000000" pitchFamily="2" charset="0"/>
+                      </a:endParaRPr>
+                    </a:p>
+                  </a:txBody>
+                  <a:tcPr anchor="ctr">
+                    <a:lnL w="57150" cap="flat" cmpd="sng" algn="ctr">
+                      <a:solidFill>
+                        <a:schemeClr val="bg1"/>
+                      </a:solidFill>
+                      <a:prstDash val="solid"/>
+                      <a:round/>
+                      <a:headEnd type="none" w="med" len="med"/>
+                      <a:tailEnd type="none" w="med" len="med"/>
+                    </a:lnL>
+                    <a:lnR w="57150" cap="flat" cmpd="sng" algn="ctr">
+                      <a:solidFill>
+                        <a:schemeClr val="bg1"/>
+                      </a:solidFill>
+                      <a:prstDash val="solid"/>
+                      <a:round/>
+                      <a:headEnd type="none" w="med" len="med"/>
+                      <a:tailEnd type="none" w="med" len="med"/>
+                    </a:lnR>
+                    <a:lnT w="57150" cap="flat" cmpd="sng" algn="ctr">
+                      <a:solidFill>
+                        <a:schemeClr val="bg1"/>
+                      </a:solidFill>
+                      <a:prstDash val="solid"/>
+                      <a:round/>
+                      <a:headEnd type="none" w="med" len="med"/>
+                      <a:tailEnd type="none" w="med" len="med"/>
+                    </a:lnT>
+                    <a:lnB w="57150" cap="flat" cmpd="sng" algn="ctr">
+                      <a:solidFill>
+                        <a:schemeClr val="bg1"/>
+                      </a:solidFill>
+                      <a:prstDash val="solid"/>
+                      <a:round/>
+                      <a:headEnd type="none" w="med" len="med"/>
+                      <a:tailEnd type="none" w="med" len="med"/>
+                    </a:lnB>
+                    <a:lnTlToBr w="12700" cmpd="sng">
+                      <a:noFill/>
+                      <a:prstDash val="solid"/>
+                    </a:lnTlToBr>
+                    <a:lnBlToTr w="12700" cmpd="sng">
+                      <a:noFill/>
+                      <a:prstDash val="solid"/>
+                    </a:lnBlToTr>
+                  </a:tcPr>
+                </a:tc>
+                <a:extLst>
+                  <a:ext uri="{0D108BD9-81ED-4DB2-BD59-A6C34878D82A}">
+                    <a16:rowId xmlns:a16="http://schemas.microsoft.com/office/drawing/2014/main" val="2333481167"/>
+                  </a:ext>
+                </a:extLst>
+              </a:tr>
+            </a:tbl>
+          </a:graphicData>
+        </a:graphic>
+      </p:graphicFrame>
+      <p:graphicFrame>
+        <p:nvGraphicFramePr>
+          <p:cNvPr id="8" name="Table 7">
+            <a:extLst>
+              <a:ext uri="{FF2B5EF4-FFF2-40B4-BE49-F238E27FC236}">
+                <a16:creationId xmlns:a16="http://schemas.microsoft.com/office/drawing/2014/main" id="{003619D7-F4C1-C58B-6E08-779B06F22D0F}"/>
+              </a:ext>
+            </a:extLst>
+          </p:cNvPr>
+          <p:cNvGraphicFramePr>
+            <a:graphicFrameLocks noGrp="1"/>
+          </p:cNvGraphicFramePr>
+          <p:nvPr/>
+        </p:nvGraphicFramePr>
+        <p:xfrm>
+          <a:off x="9052561" y="6972280"/>
+          <a:ext cx="5029146" cy="2057376"/>
+        </p:xfrm>
+        <a:graphic>
+          <a:graphicData uri="http://schemas.openxmlformats.org/drawingml/2006/table">
+            <a:tbl>
+              <a:tblPr firstRow="1" bandRow="1">
+                <a:tableStyleId>{5940675A-B579-460E-94D1-54222C63F5DA}</a:tableStyleId>
+              </a:tblPr>
+              <a:tblGrid>
+                <a:gridCol w="2514573">
+                  <a:extLst>
+                    <a:ext uri="{9D8B030D-6E8A-4147-A177-3AD203B41FA5}">
+                      <a16:colId xmlns:a16="http://schemas.microsoft.com/office/drawing/2014/main" val="3312593263"/>
+                    </a:ext>
+                  </a:extLst>
+                </a:gridCol>
+                <a:gridCol w="2514573">
+                  <a:extLst>
+                    <a:ext uri="{9D8B030D-6E8A-4147-A177-3AD203B41FA5}">
+                      <a16:colId xmlns:a16="http://schemas.microsoft.com/office/drawing/2014/main" val="3262405143"/>
+                    </a:ext>
+                  </a:extLst>
+                </a:gridCol>
+              </a:tblGrid>
+              <a:tr h="685792">
+                <a:tc>
+                  <a:txBody>
+                    <a:bodyPr/>
+                    <a:lstStyle/>
+                    <a:p>
+                      <a:pPr algn="ctr"/>
+                      <a:r>
+                        <a:rPr lang="en-US" b="1" dirty="0">
+                          <a:solidFill>
+                            <a:schemeClr val="bg1"/>
+                          </a:solidFill>
+                          <a:latin typeface="Roboto" panose="02000000000000000000" pitchFamily="2" charset="0"/>
+                          <a:ea typeface="Roboto" panose="02000000000000000000" pitchFamily="2" charset="0"/>
+                        </a:rPr>
+                        <a:t>name</a:t>
+                      </a:r>
+                    </a:p>
+                  </a:txBody>
+                  <a:tcPr anchor="ctr">
+                    <a:lnL w="57150" cap="flat" cmpd="sng" algn="ctr">
+                      <a:solidFill>
+                        <a:schemeClr val="bg1"/>
+                      </a:solidFill>
+                      <a:prstDash val="solid"/>
+                      <a:round/>
+                      <a:headEnd type="none" w="med" len="med"/>
+                      <a:tailEnd type="none" w="med" len="med"/>
+                    </a:lnL>
+                    <a:lnR w="57150" cap="flat" cmpd="sng" algn="ctr">
+                      <a:solidFill>
+                        <a:schemeClr val="bg1"/>
+                      </a:solidFill>
+                      <a:prstDash val="solid"/>
+                      <a:round/>
+                      <a:headEnd type="none" w="med" len="med"/>
+                      <a:tailEnd type="none" w="med" len="med"/>
+                    </a:lnR>
+                    <a:lnT w="57150" cap="flat" cmpd="sng" algn="ctr">
+                      <a:solidFill>
+                        <a:schemeClr val="bg1"/>
+                      </a:solidFill>
+                      <a:prstDash val="solid"/>
+                      <a:round/>
+                      <a:headEnd type="none" w="med" len="med"/>
+                      <a:tailEnd type="none" w="med" len="med"/>
+                    </a:lnT>
+                    <a:lnB w="57150" cap="flat" cmpd="sng" algn="ctr">
+                      <a:solidFill>
+                        <a:schemeClr val="bg1"/>
+                      </a:solidFill>
+                      <a:prstDash val="solid"/>
+                      <a:round/>
+                      <a:headEnd type="none" w="med" len="med"/>
+                      <a:tailEnd type="none" w="med" len="med"/>
+                    </a:lnB>
+                    <a:lnTlToBr w="12700" cmpd="sng">
+                      <a:noFill/>
+                      <a:prstDash val="solid"/>
+                    </a:lnTlToBr>
+                    <a:lnBlToTr w="12700" cmpd="sng">
+                      <a:noFill/>
+                      <a:prstDash val="solid"/>
+                    </a:lnBlToTr>
+                  </a:tcPr>
+                </a:tc>
+                <a:tc>
+                  <a:txBody>
+                    <a:bodyPr/>
+                    <a:lstStyle/>
+                    <a:p>
+                      <a:pPr algn="ctr"/>
+                      <a:r>
+                        <a:rPr lang="en-US" b="1" dirty="0">
+                          <a:solidFill>
+                            <a:schemeClr val="bg1"/>
+                          </a:solidFill>
+                          <a:latin typeface="Roboto" panose="02000000000000000000" pitchFamily="2" charset="0"/>
+                          <a:ea typeface="Roboto" panose="02000000000000000000" pitchFamily="2" charset="0"/>
+                        </a:rPr>
+                        <a:t>value</a:t>
+                      </a:r>
+                    </a:p>
+                  </a:txBody>
+                  <a:tcPr anchor="ctr">
+                    <a:lnL w="57150" cap="flat" cmpd="sng" algn="ctr">
+                      <a:solidFill>
+                        <a:schemeClr val="bg1"/>
+                      </a:solidFill>
+                      <a:prstDash val="solid"/>
+                      <a:round/>
+                      <a:headEnd type="none" w="med" len="med"/>
+                      <a:tailEnd type="none" w="med" len="med"/>
+                    </a:lnL>
+                    <a:lnR w="57150" cap="flat" cmpd="sng" algn="ctr">
+                      <a:solidFill>
+                        <a:schemeClr val="bg1"/>
+                      </a:solidFill>
+                      <a:prstDash val="solid"/>
+                      <a:round/>
+                      <a:headEnd type="none" w="med" len="med"/>
+                      <a:tailEnd type="none" w="med" len="med"/>
+                    </a:lnR>
+                    <a:lnT w="57150" cap="flat" cmpd="sng" algn="ctr">
+                      <a:solidFill>
+                        <a:schemeClr val="bg1"/>
+                      </a:solidFill>
+                      <a:prstDash val="solid"/>
+                      <a:round/>
+                      <a:headEnd type="none" w="med" len="med"/>
+                      <a:tailEnd type="none" w="med" len="med"/>
+                    </a:lnT>
+                    <a:lnB w="57150" cap="flat" cmpd="sng" algn="ctr">
+                      <a:solidFill>
+                        <a:schemeClr val="bg1"/>
+                      </a:solidFill>
+                      <a:prstDash val="solid"/>
+                      <a:round/>
+                      <a:headEnd type="none" w="med" len="med"/>
+                      <a:tailEnd type="none" w="med" len="med"/>
+                    </a:lnB>
+                    <a:lnTlToBr w="12700" cmpd="sng">
+                      <a:noFill/>
+                      <a:prstDash val="solid"/>
+                    </a:lnTlToBr>
+                    <a:lnBlToTr w="12700" cmpd="sng">
+                      <a:noFill/>
+                      <a:prstDash val="solid"/>
+                    </a:lnBlToTr>
+                  </a:tcPr>
+                </a:tc>
+                <a:extLst>
+                  <a:ext uri="{0D108BD9-81ED-4DB2-BD59-A6C34878D82A}">
+                    <a16:rowId xmlns:a16="http://schemas.microsoft.com/office/drawing/2014/main" val="3536993980"/>
+                  </a:ext>
+                </a:extLst>
+              </a:tr>
+              <a:tr h="685792">
+                <a:tc>
+                  <a:txBody>
+                    <a:bodyPr/>
+                    <a:lstStyle/>
+                    <a:p>
+                      <a:pPr algn="ctr"/>
+                      <a:r>
+                        <a:rPr lang="en-US" dirty="0">
+                          <a:solidFill>
+                            <a:schemeClr val="bg1"/>
+                          </a:solidFill>
+                          <a:latin typeface="Roboto" panose="02000000000000000000" pitchFamily="2" charset="0"/>
+                          <a:ea typeface="Roboto" panose="02000000000000000000" pitchFamily="2" charset="0"/>
+                        </a:rPr>
+                        <a:t>value</a:t>
+                      </a:r>
+                    </a:p>
+                  </a:txBody>
+                  <a:tcPr anchor="ctr">
+                    <a:lnL w="57150" cap="flat" cmpd="sng" algn="ctr">
+                      <a:solidFill>
+                        <a:schemeClr val="bg1"/>
+                      </a:solidFill>
+                      <a:prstDash val="solid"/>
+                      <a:round/>
+                      <a:headEnd type="none" w="med" len="med"/>
+                      <a:tailEnd type="none" w="med" len="med"/>
+                    </a:lnL>
+                    <a:lnR w="57150" cap="flat" cmpd="sng" algn="ctr">
+                      <a:solidFill>
+                        <a:schemeClr val="bg1"/>
+                      </a:solidFill>
+                      <a:prstDash val="solid"/>
+                      <a:round/>
+                      <a:headEnd type="none" w="med" len="med"/>
+                      <a:tailEnd type="none" w="med" len="med"/>
+                    </a:lnR>
+                    <a:lnT w="57150" cap="flat" cmpd="sng" algn="ctr">
+                      <a:solidFill>
+                        <a:schemeClr val="bg1"/>
+                      </a:solidFill>
+                      <a:prstDash val="solid"/>
+                      <a:round/>
+                      <a:headEnd type="none" w="med" len="med"/>
+                      <a:tailEnd type="none" w="med" len="med"/>
+                    </a:lnT>
+                    <a:lnB w="57150" cap="flat" cmpd="sng" algn="ctr">
+                      <a:solidFill>
+                        <a:schemeClr val="bg1"/>
+                      </a:solidFill>
+                      <a:prstDash val="solid"/>
+                      <a:round/>
+                      <a:headEnd type="none" w="med" len="med"/>
+                      <a:tailEnd type="none" w="med" len="med"/>
+                    </a:lnB>
+                    <a:lnTlToBr w="12700" cmpd="sng">
+                      <a:noFill/>
+                      <a:prstDash val="solid"/>
+                    </a:lnTlToBr>
+                    <a:lnBlToTr w="12700" cmpd="sng">
+                      <a:noFill/>
+                      <a:prstDash val="solid"/>
+                    </a:lnBlToTr>
+                  </a:tcPr>
+                </a:tc>
+                <a:tc>
+                  <a:txBody>
+                    <a:bodyPr/>
+                    <a:lstStyle/>
+                    <a:p>
+                      <a:pPr algn="ctr"/>
+                      <a:r>
+                        <a:rPr lang="en-US" dirty="0">
+                          <a:solidFill>
+                            <a:schemeClr val="bg1"/>
+                          </a:solidFill>
+                          <a:latin typeface="Roboto" panose="02000000000000000000" pitchFamily="2" charset="0"/>
+                          <a:ea typeface="Roboto" panose="02000000000000000000" pitchFamily="2" charset="0"/>
+                        </a:rPr>
+                        <a:t>4</a:t>
+                      </a:r>
+                    </a:p>
+                  </a:txBody>
+                  <a:tcPr anchor="ctr">
+                    <a:lnL w="57150" cap="flat" cmpd="sng" algn="ctr">
+                      <a:solidFill>
+                        <a:schemeClr val="bg1"/>
+                      </a:solidFill>
+                      <a:prstDash val="solid"/>
+                      <a:round/>
+                      <a:headEnd type="none" w="med" len="med"/>
+                      <a:tailEnd type="none" w="med" len="med"/>
+                    </a:lnL>
+                    <a:lnR w="57150" cap="flat" cmpd="sng" algn="ctr">
+                      <a:solidFill>
+                        <a:schemeClr val="bg1"/>
+                      </a:solidFill>
+                      <a:prstDash val="solid"/>
+                      <a:round/>
+                      <a:headEnd type="none" w="med" len="med"/>
+                      <a:tailEnd type="none" w="med" len="med"/>
+                    </a:lnR>
+                    <a:lnT w="57150" cap="flat" cmpd="sng" algn="ctr">
+                      <a:solidFill>
+                        <a:schemeClr val="bg1"/>
+                      </a:solidFill>
+                      <a:prstDash val="solid"/>
+                      <a:round/>
+                      <a:headEnd type="none" w="med" len="med"/>
+                      <a:tailEnd type="none" w="med" len="med"/>
+                    </a:lnT>
+                    <a:lnB w="57150" cap="flat" cmpd="sng" algn="ctr">
+                      <a:solidFill>
+                        <a:schemeClr val="bg1"/>
+                      </a:solidFill>
+                      <a:prstDash val="solid"/>
+                      <a:round/>
+                      <a:headEnd type="none" w="med" len="med"/>
+                      <a:tailEnd type="none" w="med" len="med"/>
+                    </a:lnB>
+                    <a:lnTlToBr w="12700" cmpd="sng">
+                      <a:noFill/>
+                      <a:prstDash val="solid"/>
+                    </a:lnTlToBr>
+                    <a:lnBlToTr w="12700" cmpd="sng">
+                      <a:noFill/>
+                      <a:prstDash val="solid"/>
+                    </a:lnBlToTr>
+                  </a:tcPr>
+                </a:tc>
+                <a:extLst>
+                  <a:ext uri="{0D108BD9-81ED-4DB2-BD59-A6C34878D82A}">
+                    <a16:rowId xmlns:a16="http://schemas.microsoft.com/office/drawing/2014/main" val="2333481167"/>
+                  </a:ext>
+                </a:extLst>
+              </a:tr>
+              <a:tr h="685792">
+                <a:tc>
+                  <a:txBody>
+                    <a:bodyPr/>
+                    <a:lstStyle/>
+                    <a:p>
+                      <a:pPr algn="ctr"/>
+                      <a:r>
+                        <a:rPr lang="en-US" dirty="0" err="1">
+                          <a:solidFill>
+                            <a:schemeClr val="bg1"/>
+                          </a:solidFill>
+                          <a:latin typeface="Roboto" panose="02000000000000000000" pitchFamily="2" charset="0"/>
+                          <a:ea typeface="Roboto" panose="02000000000000000000" pitchFamily="2" charset="0"/>
+                        </a:rPr>
+                        <a:t>timestamp_ms</a:t>
+                      </a:r>
+                      <a:endParaRPr lang="en-US" dirty="0">
+                        <a:solidFill>
+                          <a:schemeClr val="bg1"/>
+                        </a:solidFill>
+                        <a:latin typeface="Roboto" panose="02000000000000000000" pitchFamily="2" charset="0"/>
+                        <a:ea typeface="Roboto" panose="02000000000000000000" pitchFamily="2" charset="0"/>
+                      </a:endParaRPr>
+                    </a:p>
+                  </a:txBody>
+                  <a:tcPr anchor="ctr">
+                    <a:lnL w="57150" cap="flat" cmpd="sng" algn="ctr">
+                      <a:solidFill>
+                        <a:schemeClr val="bg1"/>
+                      </a:solidFill>
+                      <a:prstDash val="solid"/>
+                      <a:round/>
+                      <a:headEnd type="none" w="med" len="med"/>
+                      <a:tailEnd type="none" w="med" len="med"/>
+                    </a:lnL>
+                    <a:lnR w="57150" cap="flat" cmpd="sng" algn="ctr">
+                      <a:solidFill>
+                        <a:schemeClr val="bg1"/>
+                      </a:solidFill>
+                      <a:prstDash val="solid"/>
+                      <a:round/>
+                      <a:headEnd type="none" w="med" len="med"/>
+                      <a:tailEnd type="none" w="med" len="med"/>
+                    </a:lnR>
+                    <a:lnT w="57150" cap="flat" cmpd="sng" algn="ctr">
+                      <a:solidFill>
+                        <a:schemeClr val="bg1"/>
+                      </a:solidFill>
+                      <a:prstDash val="solid"/>
+                      <a:round/>
+                      <a:headEnd type="none" w="med" len="med"/>
+                      <a:tailEnd type="none" w="med" len="med"/>
+                    </a:lnT>
+                    <a:lnB w="57150" cap="flat" cmpd="sng" algn="ctr">
+                      <a:solidFill>
+                        <a:schemeClr val="bg1"/>
+                      </a:solidFill>
+                      <a:prstDash val="solid"/>
+                      <a:round/>
+                      <a:headEnd type="none" w="med" len="med"/>
+                      <a:tailEnd type="none" w="med" len="med"/>
+                    </a:lnB>
+                    <a:lnTlToBr w="12700" cmpd="sng">
+                      <a:noFill/>
+                      <a:prstDash val="solid"/>
+                    </a:lnTlToBr>
+                    <a:lnBlToTr w="12700" cmpd="sng">
+                      <a:noFill/>
+                      <a:prstDash val="solid"/>
+                    </a:lnBlToTr>
+                  </a:tcPr>
+                </a:tc>
+                <a:tc>
+                  <a:txBody>
+                    <a:bodyPr/>
+                    <a:lstStyle/>
+                    <a:p>
+                      <a:pPr algn="ctr"/>
+                      <a:r>
+                        <a:rPr lang="en-US" dirty="0">
+                          <a:solidFill>
+                            <a:schemeClr val="bg1"/>
+                          </a:solidFill>
+                          <a:latin typeface="Roboto" panose="02000000000000000000" pitchFamily="2" charset="0"/>
+                          <a:ea typeface="Roboto" panose="02000000000000000000" pitchFamily="2" charset="0"/>
+                        </a:rPr>
+                        <a:t>100</a:t>
+                      </a:r>
+                    </a:p>
+                  </a:txBody>
+                  <a:tcPr anchor="ctr">
+                    <a:lnL w="57150" cap="flat" cmpd="sng" algn="ctr">
+                      <a:solidFill>
+                        <a:schemeClr val="bg1"/>
+                      </a:solidFill>
+                      <a:prstDash val="solid"/>
+                      <a:round/>
+                      <a:headEnd type="none" w="med" len="med"/>
+                      <a:tailEnd type="none" w="med" len="med"/>
+                    </a:lnL>
+                    <a:lnR w="57150" cap="flat" cmpd="sng" algn="ctr">
+                      <a:solidFill>
+                        <a:schemeClr val="bg1"/>
+                      </a:solidFill>
+                      <a:prstDash val="solid"/>
+                      <a:round/>
+                      <a:headEnd type="none" w="med" len="med"/>
+                      <a:tailEnd type="none" w="med" len="med"/>
+                    </a:lnR>
+                    <a:lnT w="57150" cap="flat" cmpd="sng" algn="ctr">
+                      <a:solidFill>
+                        <a:schemeClr val="bg1"/>
+                      </a:solidFill>
+                      <a:prstDash val="solid"/>
+                      <a:round/>
+                      <a:headEnd type="none" w="med" len="med"/>
+                      <a:tailEnd type="none" w="med" len="med"/>
+                    </a:lnT>
+                    <a:lnB w="57150" cap="flat" cmpd="sng" algn="ctr">
+                      <a:solidFill>
+                        <a:schemeClr val="bg1"/>
+                      </a:solidFill>
+                      <a:prstDash val="solid"/>
+                      <a:round/>
+                      <a:headEnd type="none" w="med" len="med"/>
+                      <a:tailEnd type="none" w="med" len="med"/>
+                    </a:lnB>
+                    <a:lnTlToBr w="12700" cmpd="sng">
+                      <a:noFill/>
+                      <a:prstDash val="solid"/>
+                    </a:lnTlToBr>
+                    <a:lnBlToTr w="12700" cmpd="sng">
+                      <a:noFill/>
+                      <a:prstDash val="solid"/>
+                    </a:lnBlToTr>
+                  </a:tcPr>
+                </a:tc>
+                <a:extLst>
+                  <a:ext uri="{0D108BD9-81ED-4DB2-BD59-A6C34878D82A}">
+                    <a16:rowId xmlns:a16="http://schemas.microsoft.com/office/drawing/2014/main" val="1026097902"/>
+                  </a:ext>
+                </a:extLst>
+              </a:tr>
+            </a:tbl>
+          </a:graphicData>
+        </a:graphic>
+      </p:graphicFrame>
+      <p:sp>
+        <p:nvSpPr>
+          <p:cNvPr id="9" name="TextBox 8">
+            <a:extLst>
+              <a:ext uri="{FF2B5EF4-FFF2-40B4-BE49-F238E27FC236}">
+                <a16:creationId xmlns:a16="http://schemas.microsoft.com/office/drawing/2014/main" id="{BC679C92-1C29-A7E1-8A75-3ED56DCD4ED0}"/>
+              </a:ext>
+            </a:extLst>
+          </p:cNvPr>
+          <p:cNvSpPr txBox="1"/>
+          <p:nvPr/>
+        </p:nvSpPr>
+        <p:spPr>
+          <a:xfrm>
+            <a:off x="4752330" y="6264394"/>
+            <a:ext cx="1729961" cy="707886"/>
+          </a:xfrm>
+          <a:prstGeom prst="rect">
+            <a:avLst/>
+          </a:prstGeom>
+          <a:noFill/>
+        </p:spPr>
+        <p:txBody>
+          <a:bodyPr wrap="none" rtlCol="0">
+            <a:spAutoFit/>
+          </a:bodyPr>
+          <a:lstStyle/>
+          <a:p>
+            <a:r>
+              <a:rPr lang="en-US" sz="4000" dirty="0" err="1">
+                <a:solidFill>
+                  <a:schemeClr val="bg1"/>
+                </a:solidFill>
+                <a:latin typeface="Roboto" panose="02000000000000000000" pitchFamily="2" charset="0"/>
+                <a:ea typeface="Roboto" panose="02000000000000000000" pitchFamily="2" charset="0"/>
+              </a:rPr>
+              <a:t>my_ref</a:t>
+            </a:r>
+            <a:endParaRPr lang="en-US" sz="4000" dirty="0">
+              <a:solidFill>
+                <a:schemeClr val="bg1"/>
+              </a:solidFill>
+              <a:latin typeface="Roboto" panose="02000000000000000000" pitchFamily="2" charset="0"/>
+              <a:ea typeface="Roboto" panose="02000000000000000000" pitchFamily="2" charset="0"/>
+            </a:endParaRPr>
+          </a:p>
+        </p:txBody>
+      </p:sp>
+      <p:sp>
+        <p:nvSpPr>
+          <p:cNvPr id="10" name="TextBox 9">
+            <a:extLst>
+              <a:ext uri="{FF2B5EF4-FFF2-40B4-BE49-F238E27FC236}">
+                <a16:creationId xmlns:a16="http://schemas.microsoft.com/office/drawing/2014/main" id="{ABAC544A-92D8-AC88-8AE6-59F3D4EDB90D}"/>
+              </a:ext>
+            </a:extLst>
+          </p:cNvPr>
+          <p:cNvSpPr txBox="1"/>
+          <p:nvPr/>
+        </p:nvSpPr>
+        <p:spPr>
+          <a:xfrm>
+            <a:off x="10619598" y="6264394"/>
+            <a:ext cx="1895071" cy="707886"/>
+          </a:xfrm>
+          <a:prstGeom prst="rect">
+            <a:avLst/>
+          </a:prstGeom>
+          <a:noFill/>
+        </p:spPr>
+        <p:txBody>
+          <a:bodyPr wrap="none" rtlCol="0">
+            <a:spAutoFit/>
+          </a:bodyPr>
+          <a:lstStyle/>
+          <a:p>
+            <a:r>
+              <a:rPr lang="en-US" sz="4000" dirty="0">
+                <a:solidFill>
+                  <a:schemeClr val="bg1"/>
+                </a:solidFill>
+                <a:latin typeface="Roboto" panose="02000000000000000000" pitchFamily="2" charset="0"/>
+                <a:ea typeface="Roboto" panose="02000000000000000000" pitchFamily="2" charset="0"/>
+              </a:rPr>
+              <a:t>reading</a:t>
+            </a:r>
+          </a:p>
+        </p:txBody>
+      </p:sp>
+      <p:cxnSp>
+        <p:nvCxnSpPr>
+          <p:cNvPr id="12" name="Straight Arrow Connector 11">
+            <a:extLst>
+              <a:ext uri="{FF2B5EF4-FFF2-40B4-BE49-F238E27FC236}">
+                <a16:creationId xmlns:a16="http://schemas.microsoft.com/office/drawing/2014/main" id="{65DF1656-370A-EE18-7956-FFDE322465F6}"/>
+              </a:ext>
+            </a:extLst>
+          </p:cNvPr>
+          <p:cNvCxnSpPr>
+            <a:cxnSpLocks/>
+          </p:cNvCxnSpPr>
+          <p:nvPr/>
+        </p:nvCxnSpPr>
+        <p:spPr>
+          <a:xfrm>
+            <a:off x="6309391" y="7978109"/>
+            <a:ext cx="2560293" cy="0"/>
+          </a:xfrm>
+          <a:prstGeom prst="straightConnector1">
+            <a:avLst/>
+          </a:prstGeom>
+          <a:ln w="57150">
+            <a:solidFill>
+              <a:schemeClr val="bg1"/>
+            </a:solidFill>
+            <a:headEnd type="none" w="med" len="med"/>
+            <a:tailEnd type="arrow" w="med" len="med"/>
+          </a:ln>
+        </p:spPr>
+        <p:style>
+          <a:lnRef idx="1">
+            <a:schemeClr val="accent1"/>
+          </a:lnRef>
+          <a:fillRef idx="0">
+            <a:schemeClr val="accent1"/>
+          </a:fillRef>
+          <a:effectRef idx="0">
+            <a:schemeClr val="accent1"/>
+          </a:effectRef>
+          <a:fontRef idx="minor">
+            <a:schemeClr val="tx1"/>
+          </a:fontRef>
+        </p:style>
+      </p:cxnSp>
+    </p:spTree>
+    <p:extLst>
+      <p:ext uri="{BB962C8B-B14F-4D97-AF65-F5344CB8AC3E}">
+        <p14:creationId xmlns:p14="http://schemas.microsoft.com/office/powerpoint/2010/main" val="3867959063"/>
+      </p:ext>
+    </p:extLst>
+  </p:cSld>
+  <p:clrMapOvr>
+    <a:masterClrMapping/>
+  </p:clrMapOvr>
+  <mc:AlternateContent xmlns:mc="http://schemas.openxmlformats.org/markup-compatibility/2006" xmlns:p14="http://schemas.microsoft.com/office/powerpoint/2010/main">
+    <mc:Choice Requires="p14">
+      <p:transition spd="med" p14:dur="700">
+        <p:fade/>
+      </p:transition>
+    </mc:Choice>
+    <mc:Fallback xmlns="">
+      <p:transition spd="med">
+        <p:fade/>
+      </p:transition>
+    </mc:Fallback>
+  </mc:AlternateContent>
+</p:sld>
+</file>
+
+<file path=ppt/slides/slide19.xml><?xml version="1.0" encoding="utf-8"?>
+<p:sld xmlns:a="http://schemas.openxmlformats.org/drawingml/2006/main" xmlns:r="http://schemas.openxmlformats.org/officeDocument/2006/relationships" xmlns:p="http://schemas.openxmlformats.org/presentationml/2006/main">
+  <p:cSld>
+    <p:spTree>
+      <p:nvGrpSpPr>
+        <p:cNvPr id="1" name="">
+          <a:extLst>
+            <a:ext uri="{FF2B5EF4-FFF2-40B4-BE49-F238E27FC236}">
+              <a16:creationId xmlns:a16="http://schemas.microsoft.com/office/drawing/2014/main" id="{832BAFBF-4B5E-9975-E540-053A58B0A284}"/>
+            </a:ext>
+          </a:extLst>
+        </p:cNvPr>
+        <p:cNvGrpSpPr/>
+        <p:nvPr/>
+      </p:nvGrpSpPr>
+      <p:grpSpPr>
+        <a:xfrm>
+          <a:off x="0" y="0"/>
+          <a:ext cx="0" cy="0"/>
+          <a:chOff x="0" y="0"/>
+          <a:chExt cx="0" cy="0"/>
+        </a:xfrm>
+      </p:grpSpPr>
+      <p:sp>
+        <p:nvSpPr>
+          <p:cNvPr id="6" name="Content Placeholder 5">
+            <a:extLst>
+              <a:ext uri="{FF2B5EF4-FFF2-40B4-BE49-F238E27FC236}">
+                <a16:creationId xmlns:a16="http://schemas.microsoft.com/office/drawing/2014/main" id="{AFF27125-5536-6751-F1AC-01B630115914}"/>
+              </a:ext>
+            </a:extLst>
+          </p:cNvPr>
+          <p:cNvSpPr>
+            <a:spLocks noGrp="1"/>
+          </p:cNvSpPr>
+          <p:nvPr>
+            <p:ph idx="1"/>
+          </p:nvPr>
+        </p:nvSpPr>
+        <p:spPr>
+          <a:xfrm>
+            <a:off x="1817407" y="1851696"/>
+            <a:ext cx="14653186" cy="7863754"/>
+          </a:xfrm>
+        </p:spPr>
+        <p:txBody>
+          <a:bodyPr/>
+          <a:lstStyle/>
+          <a:p>
+            <a:pPr marL="742950" indent="-742950">
+              <a:buFont typeface="+mj-lt"/>
+              <a:buAutoNum type="arabicPeriod"/>
+            </a:pPr>
+            <a:r>
+              <a:rPr lang="en-US" dirty="0"/>
+              <a:t>Each value in Rust has an owner.</a:t>
+            </a:r>
+          </a:p>
+          <a:p>
+            <a:pPr marL="742950" indent="-742950">
+              <a:buFont typeface="+mj-lt"/>
+              <a:buAutoNum type="arabicPeriod"/>
+            </a:pPr>
+            <a:r>
+              <a:rPr lang="en-US" dirty="0"/>
+              <a:t>There can only be one owner at a time.</a:t>
+            </a:r>
+          </a:p>
+          <a:p>
+            <a:pPr marL="742950" indent="-742950">
+              <a:buFont typeface="+mj-lt"/>
+              <a:buAutoNum type="arabicPeriod"/>
+            </a:pPr>
+            <a:r>
+              <a:rPr lang="en-US" dirty="0"/>
+              <a:t>When the owner goes out of scope, the value will be dropped.</a:t>
+            </a:r>
+          </a:p>
+          <a:p>
+            <a:pPr marL="742950" indent="-742950">
+              <a:buFont typeface="+mj-lt"/>
+              <a:buAutoNum type="arabicPeriod"/>
+            </a:pPr>
+            <a:r>
+              <a:rPr lang="en-US" dirty="0"/>
+              <a:t>You can have either one mutable reference or any number of immutable references.</a:t>
+            </a:r>
+          </a:p>
+          <a:p>
+            <a:pPr marL="742950" indent="-742950">
+              <a:buFont typeface="+mj-lt"/>
+              <a:buAutoNum type="arabicPeriod"/>
+            </a:pPr>
+            <a:r>
+              <a:rPr lang="en-US" dirty="0"/>
+              <a:t>References must always be valid.</a:t>
+            </a:r>
+          </a:p>
+          <a:p>
+            <a:pPr marL="742950" indent="-742950">
+              <a:buFont typeface="+mj-lt"/>
+              <a:buAutoNum type="arabicPeriod"/>
+            </a:pPr>
+            <a:r>
+              <a:rPr lang="en-US" dirty="0"/>
+              <a:t>If you move out part of a value, you cannot use the whole value anymore.</a:t>
+            </a:r>
+          </a:p>
+          <a:p>
+            <a:pPr marL="742950" indent="-742950">
+              <a:buFont typeface="+mj-lt"/>
+              <a:buAutoNum type="arabicPeriod"/>
+            </a:pPr>
+            <a:r>
+              <a:rPr lang="en-US" dirty="0"/>
+              <a:t>Slices are references to the whole value and follow the same borrowing rules.</a:t>
+            </a:r>
+          </a:p>
+        </p:txBody>
+      </p:sp>
+      <p:sp>
+        <p:nvSpPr>
+          <p:cNvPr id="9" name="Title 1">
+            <a:extLst>
+              <a:ext uri="{FF2B5EF4-FFF2-40B4-BE49-F238E27FC236}">
+                <a16:creationId xmlns:a16="http://schemas.microsoft.com/office/drawing/2014/main" id="{8016AF11-1217-7BA9-F5E4-A37CBD1A92ED}"/>
+              </a:ext>
+            </a:extLst>
+          </p:cNvPr>
+          <p:cNvSpPr txBox="1">
+            <a:spLocks/>
+          </p:cNvSpPr>
+          <p:nvPr/>
+        </p:nvSpPr>
+        <p:spPr>
+          <a:xfrm>
+            <a:off x="1257300" y="0"/>
+            <a:ext cx="15773400" cy="1988345"/>
+          </a:xfrm>
+          <a:prstGeom prst="rect">
+            <a:avLst/>
+          </a:prstGeom>
+        </p:spPr>
+        <p:txBody>
+          <a:bodyPr vert="horz" lIns="91440" tIns="45720" rIns="91440" bIns="45720" rtlCol="0" anchor="ctr">
+            <a:normAutofit/>
+          </a:bodyPr>
+          <a:lstStyle>
+            <a:lvl1pPr algn="l" defTabSz="1371600" rtl="0" eaLnBrk="1" latinLnBrk="0" hangingPunct="1">
+              <a:lnSpc>
+                <a:spcPct val="90000"/>
+              </a:lnSpc>
+              <a:spcBef>
+                <a:spcPct val="0"/>
+              </a:spcBef>
+              <a:buNone/>
+              <a:defRPr sz="6600" kern="1200">
+                <a:solidFill>
+                  <a:srgbClr val="FF2100"/>
+                </a:solidFill>
+                <a:latin typeface="DigiKey Artex" pitchFamily="50" charset="0"/>
+                <a:ea typeface="+mj-ea"/>
+                <a:cs typeface="+mj-cs"/>
+              </a:defRPr>
+            </a:lvl1pPr>
+          </a:lstStyle>
+          <a:p>
+            <a:pPr algn="ctr"/>
+            <a:r>
+              <a:rPr lang="en-US"/>
+              <a:t>Ownership and Borrowing Rules</a:t>
+            </a:r>
+            <a:endParaRPr lang="en-US" dirty="0"/>
+          </a:p>
+        </p:txBody>
+      </p:sp>
+    </p:spTree>
+    <p:extLst>
+      <p:ext uri="{BB962C8B-B14F-4D97-AF65-F5344CB8AC3E}">
+        <p14:creationId xmlns:p14="http://schemas.microsoft.com/office/powerpoint/2010/main" val="2846608116"/>
+      </p:ext>
+    </p:extLst>
+  </p:cSld>
+  <p:clrMapOvr>
+    <a:masterClrMapping/>
+  </p:clrMapOvr>
+  <mc:AlternateContent xmlns:mc="http://schemas.openxmlformats.org/markup-compatibility/2006" xmlns:p14="http://schemas.microsoft.com/office/powerpoint/2010/main">
+    <mc:Choice Requires="p14">
+      <p:transition spd="med" p14:dur="700">
+        <p:fade/>
+      </p:transition>
+    </mc:Choice>
+    <mc:Fallback xmlns="">
+      <p:transition spd="med">
+        <p:fade/>
+      </p:transition>
+    </mc:Fallback>
+  </mc:AlternateContent>
+</p:sld>
+</file>
+
 <file path=ppt/slides/slide2.xml><?xml version="1.0" encoding="utf-8"?>
 <p:sld xmlns:a="http://schemas.openxmlformats.org/drawingml/2006/main" xmlns:r="http://schemas.openxmlformats.org/officeDocument/2006/relationships" xmlns:p="http://schemas.openxmlformats.org/presentationml/2006/main">
   <p:cSld>
@@ -4271,13 +6677,105 @@
   <p:clrMapOvr>
     <a:masterClrMapping/>
   </p:clrMapOvr>
-  <mc:AlternateContent xmlns:mc="http://schemas.openxmlformats.org/markup-compatibility/2006">
-    <mc:Choice xmlns:p14="http://schemas.microsoft.com/office/powerpoint/2010/main" Requires="p14">
+  <mc:AlternateContent xmlns:mc="http://schemas.openxmlformats.org/markup-compatibility/2006" xmlns:p14="http://schemas.microsoft.com/office/powerpoint/2010/main">
+    <mc:Choice Requires="p14">
       <p:transition spd="med" p14:dur="700">
         <p:fade/>
       </p:transition>
     </mc:Choice>
-    <mc:Fallback>
+    <mc:Fallback xmlns="">
+      <p:transition spd="med">
+        <p:fade/>
+      </p:transition>
+    </mc:Fallback>
+  </mc:AlternateContent>
+</p:sld>
+</file>
+
+<file path=ppt/slides/slide20.xml><?xml version="1.0" encoding="utf-8"?>
+<p:sld xmlns:a="http://schemas.openxmlformats.org/drawingml/2006/main" xmlns:r="http://schemas.openxmlformats.org/officeDocument/2006/relationships" xmlns:p="http://schemas.openxmlformats.org/presentationml/2006/main">
+  <p:cSld>
+    <p:spTree>
+      <p:nvGrpSpPr>
+        <p:cNvPr id="1" name=""/>
+        <p:cNvGrpSpPr/>
+        <p:nvPr/>
+      </p:nvGrpSpPr>
+      <p:grpSpPr>
+        <a:xfrm>
+          <a:off x="0" y="0"/>
+          <a:ext cx="0" cy="0"/>
+          <a:chOff x="0" y="0"/>
+          <a:chExt cx="0" cy="0"/>
+        </a:xfrm>
+      </p:grpSpPr>
+      <p:sp>
+        <p:nvSpPr>
+          <p:cNvPr id="2" name="Title 1">
+            <a:extLst>
+              <a:ext uri="{FF2B5EF4-FFF2-40B4-BE49-F238E27FC236}">
+                <a16:creationId xmlns:a16="http://schemas.microsoft.com/office/drawing/2014/main" id="{441CB2B3-B9E6-6140-57C9-8C915F9C410D}"/>
+              </a:ext>
+            </a:extLst>
+          </p:cNvPr>
+          <p:cNvSpPr>
+            <a:spLocks noGrp="1"/>
+          </p:cNvSpPr>
+          <p:nvPr>
+            <p:ph type="title"/>
+          </p:nvPr>
+        </p:nvSpPr>
+        <p:spPr/>
+        <p:txBody>
+          <a:bodyPr/>
+          <a:lstStyle/>
+          <a:p>
+            <a:endParaRPr lang="en-US"/>
+          </a:p>
+        </p:txBody>
+      </p:sp>
+      <p:sp>
+        <p:nvSpPr>
+          <p:cNvPr id="3" name="Text Placeholder 2">
+            <a:extLst>
+              <a:ext uri="{FF2B5EF4-FFF2-40B4-BE49-F238E27FC236}">
+                <a16:creationId xmlns:a16="http://schemas.microsoft.com/office/drawing/2014/main" id="{17AFD46E-97E6-4676-1778-413666275E6D}"/>
+              </a:ext>
+            </a:extLst>
+          </p:cNvPr>
+          <p:cNvSpPr>
+            <a:spLocks noGrp="1"/>
+          </p:cNvSpPr>
+          <p:nvPr>
+            <p:ph type="body" idx="1"/>
+          </p:nvPr>
+        </p:nvSpPr>
+        <p:spPr/>
+        <p:txBody>
+          <a:bodyPr/>
+          <a:lstStyle/>
+          <a:p>
+            <a:endParaRPr lang="en-US"/>
+          </a:p>
+        </p:txBody>
+      </p:sp>
+    </p:spTree>
+    <p:extLst>
+      <p:ext uri="{BB962C8B-B14F-4D97-AF65-F5344CB8AC3E}">
+        <p14:creationId xmlns:p14="http://schemas.microsoft.com/office/powerpoint/2010/main" val="1482434578"/>
+      </p:ext>
+    </p:extLst>
+  </p:cSld>
+  <p:clrMapOvr>
+    <a:masterClrMapping/>
+  </p:clrMapOvr>
+  <mc:AlternateContent xmlns:mc="http://schemas.openxmlformats.org/markup-compatibility/2006" xmlns:p14="http://schemas.microsoft.com/office/powerpoint/2010/main">
+    <mc:Choice Requires="p14">
+      <p:transition spd="med" p14:dur="700">
+        <p:fade/>
+      </p:transition>
+    </mc:Choice>
+    <mc:Fallback xmlns="">
       <p:transition spd="med">
         <p:fade/>
       </p:transition>

</xml_diff>